<commit_message>
Appendix charts and JD's changes
</commit_message>
<xml_diff>
--- a/atlas/AppendixCharts2.pptx
+++ b/atlas/AppendixCharts2.pptx
@@ -6,10 +6,10 @@
     <p:sldMasterId id="2147483682" r:id="rId2"/>
   </p:sldMasterIdLst>
   <p:notesMasterIdLst>
-    <p:notesMasterId r:id="rId13"/>
+    <p:notesMasterId r:id="rId12"/>
   </p:notesMasterIdLst>
   <p:handoutMasterIdLst>
-    <p:handoutMasterId r:id="rId14"/>
+    <p:handoutMasterId r:id="rId13"/>
   </p:handoutMasterIdLst>
   <p:sldIdLst>
     <p:sldId id="873" r:id="rId3"/>
@@ -20,10 +20,9 @@
     <p:sldId id="880" r:id="rId8"/>
     <p:sldId id="881" r:id="rId9"/>
     <p:sldId id="882" r:id="rId10"/>
-    <p:sldId id="878" r:id="rId11"/>
-    <p:sldId id="879" r:id="rId12"/>
+    <p:sldId id="884" r:id="rId11"/>
   </p:sldIdLst>
-  <p:sldSz cx="9906000" cy="6858000" type="A4"/>
+  <p:sldSz cx="9906000" cy="5040313"/>
   <p:notesSz cx="6807200" cy="9939338"/>
   <p:defaultTextStyle>
     <a:defPPr>
@@ -153,17 +152,17 @@
   <p:extLst>
     <p:ext uri="{EFAFB233-063F-42B5-8137-9DF3F51BA10A}">
       <p15:sldGuideLst xmlns:p15="http://schemas.microsoft.com/office/powerpoint/2012/main">
-        <p15:guide id="1" orient="horz" pos="4001">
+        <p15:guide id="1" orient="horz" pos="2941" userDrawn="1">
           <p15:clr>
             <a:srgbClr val="A4A3A4"/>
           </p15:clr>
         </p15:guide>
-        <p15:guide id="2" orient="horz" pos="80">
+        <p15:guide id="2" orient="horz" pos="59" userDrawn="1">
           <p15:clr>
             <a:srgbClr val="A4A3A4"/>
           </p15:clr>
         </p15:guide>
-        <p15:guide id="3" pos="398">
+        <p15:guide id="3" pos="398" userDrawn="1">
           <p15:clr>
             <a:srgbClr val="A4A3A4"/>
           </p15:clr>
@@ -3299,8 +3298,8 @@
         </p:nvSpPr>
         <p:spPr bwMode="auto">
           <a:xfrm>
-            <a:off x="714375" y="746125"/>
-            <a:ext cx="5380038" cy="3725863"/>
+            <a:off x="-255588" y="746125"/>
+            <a:ext cx="7319963" cy="3725863"/>
           </a:xfrm>
           <a:prstGeom prst="rect">
             <a:avLst/>
@@ -3667,7 +3666,12 @@
             <p:ph type="sldImg"/>
           </p:nvPr>
         </p:nvSpPr>
-        <p:spPr/>
+        <p:spPr>
+          <a:xfrm>
+            <a:off x="-255588" y="746125"/>
+            <a:ext cx="7319963" cy="3725863"/>
+          </a:xfrm>
+        </p:spPr>
       </p:sp>
       <p:sp>
         <p:nvSpPr>
@@ -3922,506 +3926,6 @@
 </p:notes>
 </file>
 
-<file path=ppt/notesSlides/notesSlide2.xml><?xml version="1.0" encoding="utf-8"?>
-<p:notes xmlns:a="http://schemas.openxmlformats.org/drawingml/2006/main" xmlns:r="http://schemas.openxmlformats.org/officeDocument/2006/relationships" xmlns:p="http://schemas.openxmlformats.org/presentationml/2006/main">
-  <p:cSld>
-    <p:spTree>
-      <p:nvGrpSpPr>
-        <p:cNvPr id="1" name=""/>
-        <p:cNvGrpSpPr/>
-        <p:nvPr/>
-      </p:nvGrpSpPr>
-      <p:grpSpPr>
-        <a:xfrm>
-          <a:off x="0" y="0"/>
-          <a:ext cx="0" cy="0"/>
-          <a:chOff x="0" y="0"/>
-          <a:chExt cx="0" cy="0"/>
-        </a:xfrm>
-      </p:grpSpPr>
-      <p:sp>
-        <p:nvSpPr>
-          <p:cNvPr id="2" name="Slide Image Placeholder 1"/>
-          <p:cNvSpPr>
-            <a:spLocks noGrp="1" noRot="1" noChangeAspect="1"/>
-          </p:cNvSpPr>
-          <p:nvPr>
-            <p:ph type="sldImg"/>
-          </p:nvPr>
-        </p:nvSpPr>
-        <p:spPr/>
-      </p:sp>
-      <p:sp>
-        <p:nvSpPr>
-          <p:cNvPr id="3" name="Notes Placeholder 2"/>
-          <p:cNvSpPr>
-            <a:spLocks noGrp="1"/>
-          </p:cNvSpPr>
-          <p:nvPr>
-            <p:ph type="body" idx="1"/>
-          </p:nvPr>
-        </p:nvSpPr>
-        <p:spPr/>
-        <p:txBody>
-          <a:bodyPr/>
-          <a:lstStyle/>
-          <a:p>
-            <a:pPr marL="0" marR="0" indent="0" algn="l" defTabSz="914400" rtl="0" eaLnBrk="1" fontAlgn="base" latinLnBrk="0" hangingPunct="1">
-              <a:lnSpc>
-                <a:spcPct val="100000"/>
-              </a:lnSpc>
-              <a:spcBef>
-                <a:spcPct val="30000"/>
-              </a:spcBef>
-              <a:spcAft>
-                <a:spcPct val="0"/>
-              </a:spcAft>
-              <a:buClrTx/>
-              <a:buSzTx/>
-              <a:buFontTx/>
-              <a:buNone/>
-              <a:tabLst/>
-              <a:defRPr/>
-            </a:pPr>
-            <a:r>
-              <a:rPr lang="en-AU" dirty="0">
-                <a:latin typeface="Arial"/>
-                <a:cs typeface="Arial"/>
-              </a:rPr>
-              <a:t>This</a:t>
-            </a:r>
-            <a:r>
-              <a:rPr lang="en-AU" baseline="0" dirty="0">
-                <a:latin typeface="Arial"/>
-                <a:cs typeface="Arial"/>
-              </a:rPr>
-              <a:t> chart has been reviewed on 21/10/2016.</a:t>
-            </a:r>
-            <a:endParaRPr lang="en-AU" dirty="0">
-              <a:latin typeface="Arial"/>
-              <a:cs typeface="Arial"/>
-            </a:endParaRPr>
-          </a:p>
-          <a:p>
-            <a:endParaRPr lang="en-AU" dirty="0"/>
-          </a:p>
-          <a:p>
-            <a:r>
-              <a:rPr lang="en-AU" dirty="0"/>
-              <a:t>Title: </a:t>
-            </a:r>
-            <a:r>
-              <a:rPr lang="en-AU" sz="1200" kern="1200" baseline="0" dirty="0">
-                <a:solidFill>
-                  <a:schemeClr val="tx1"/>
-                </a:solidFill>
-                <a:effectLst/>
-                <a:latin typeface="Arial" charset="0"/>
-                <a:ea typeface="ＭＳ Ｐゴシック" pitchFamily="34" charset="-128"/>
-                <a:cs typeface="+mn-cs"/>
-              </a:rPr>
-              <a:t>Key risk measurement and management concepts</a:t>
-            </a:r>
-          </a:p>
-          <a:p>
-            <a:r>
-              <a:rPr lang="en-AU" sz="1200" kern="1200" baseline="0" dirty="0">
-                <a:solidFill>
-                  <a:schemeClr val="tx1"/>
-                </a:solidFill>
-                <a:effectLst/>
-                <a:latin typeface="Arial" charset="0"/>
-                <a:ea typeface="ＭＳ Ｐゴシック" pitchFamily="34" charset="-128"/>
-                <a:cs typeface="+mn-cs"/>
-              </a:rPr>
-              <a:t>Subtitle: Illustrative probability distribution of cost outcomes on individual projects, per cent</a:t>
-            </a:r>
-          </a:p>
-          <a:p>
-            <a:endParaRPr lang="en-AU" sz="1200" kern="1200" baseline="0" dirty="0">
-              <a:solidFill>
-                <a:schemeClr val="tx1"/>
-              </a:solidFill>
-              <a:effectLst/>
-              <a:latin typeface="Arial" charset="0"/>
-              <a:ea typeface="ＭＳ Ｐゴシック" pitchFamily="34" charset="-128"/>
-              <a:cs typeface="+mn-cs"/>
-            </a:endParaRPr>
-          </a:p>
-          <a:p>
-            <a:r>
-              <a:rPr lang="en-AU" sz="1200" kern="1200" baseline="0" dirty="0">
-                <a:solidFill>
-                  <a:schemeClr val="tx1"/>
-                </a:solidFill>
-                <a:effectLst/>
-                <a:latin typeface="Arial" charset="0"/>
-                <a:ea typeface="ＭＳ Ｐゴシック" pitchFamily="34" charset="-128"/>
-                <a:cs typeface="+mn-cs"/>
-              </a:rPr>
-              <a:t>Notes: </a:t>
-            </a:r>
-            <a:r>
-              <a:rPr lang="en-AU" sz="1200" i="1" kern="1200" baseline="0" dirty="0">
-                <a:solidFill>
-                  <a:schemeClr val="tx1"/>
-                </a:solidFill>
-                <a:effectLst/>
-                <a:latin typeface="Arial" charset="0"/>
-                <a:ea typeface="ＭＳ Ｐゴシック" pitchFamily="34" charset="-128"/>
-                <a:cs typeface="+mn-cs"/>
-              </a:rPr>
-              <a:t>The distribution of cost risks depicted is a stylized representation of the distribution of cost overruns observed in the Investment Monitor; see appendix xx for details. This graph’s illustrative purpose is to graphically present the relative distances between the median, 90</a:t>
-            </a:r>
-            <a:r>
-              <a:rPr lang="en-AU" sz="1200" i="1" kern="1200" baseline="30000" dirty="0">
-                <a:solidFill>
-                  <a:schemeClr val="tx1"/>
-                </a:solidFill>
-                <a:effectLst/>
-                <a:latin typeface="Arial" charset="0"/>
-                <a:ea typeface="ＭＳ Ｐゴシック" pitchFamily="34" charset="-128"/>
-                <a:cs typeface="+mn-cs"/>
-              </a:rPr>
-              <a:t>th</a:t>
-            </a:r>
-            <a:r>
-              <a:rPr lang="en-AU" sz="1200" i="1" kern="1200" baseline="0" dirty="0">
-                <a:solidFill>
-                  <a:schemeClr val="tx1"/>
-                </a:solidFill>
-                <a:effectLst/>
-                <a:latin typeface="Arial" charset="0"/>
-                <a:ea typeface="ＭＳ Ｐゴシック" pitchFamily="34" charset="-128"/>
-                <a:cs typeface="+mn-cs"/>
-              </a:rPr>
-              <a:t> quantile and expected value of cost overruns.</a:t>
-            </a:r>
-            <a:br>
-              <a:rPr lang="en-AU" sz="1200" i="1" kern="1200" baseline="0" dirty="0">
-                <a:solidFill>
-                  <a:schemeClr val="tx1"/>
-                </a:solidFill>
-                <a:effectLst/>
-                <a:latin typeface="Arial" charset="0"/>
-                <a:ea typeface="ＭＳ Ｐゴシック" pitchFamily="34" charset="-128"/>
-                <a:cs typeface="+mn-cs"/>
-              </a:rPr>
-            </a:br>
-            <a:endParaRPr lang="en-AU" sz="1200" kern="1200" baseline="0" dirty="0">
-              <a:solidFill>
-                <a:schemeClr val="tx1"/>
-              </a:solidFill>
-              <a:effectLst/>
-              <a:latin typeface="Arial" charset="0"/>
-              <a:ea typeface="ＭＳ Ｐゴシック" pitchFamily="34" charset="-128"/>
-              <a:cs typeface="+mn-cs"/>
-            </a:endParaRPr>
-          </a:p>
-          <a:p>
-            <a:r>
-              <a:rPr lang="en-AU" sz="1200" kern="1200" baseline="0" dirty="0">
-                <a:solidFill>
-                  <a:schemeClr val="tx1"/>
-                </a:solidFill>
-                <a:effectLst/>
-                <a:latin typeface="Arial" charset="0"/>
-                <a:ea typeface="ＭＳ Ｐゴシック" pitchFamily="34" charset="-128"/>
-                <a:cs typeface="+mn-cs"/>
-              </a:rPr>
-              <a:t>Sources: Deloitte Investment Monitor, Grattan analysis</a:t>
-            </a:r>
-            <a:endParaRPr lang="en-AU" dirty="0"/>
-          </a:p>
-        </p:txBody>
-      </p:sp>
-      <p:sp>
-        <p:nvSpPr>
-          <p:cNvPr id="4" name="Slide Number Placeholder 3"/>
-          <p:cNvSpPr>
-            <a:spLocks noGrp="1"/>
-          </p:cNvSpPr>
-          <p:nvPr>
-            <p:ph type="sldNum" sz="quarter" idx="10"/>
-          </p:nvPr>
-        </p:nvSpPr>
-        <p:spPr/>
-        <p:txBody>
-          <a:bodyPr/>
-          <a:lstStyle/>
-          <a:p>
-            <a:fld id="{EE67FFEB-41A8-4E33-A442-87C345D03039}" type="slidenum">
-              <a:rPr lang="en-US" smtClean="0"/>
-              <a:pPr/>
-              <a:t>9</a:t>
-            </a:fld>
-            <a:endParaRPr lang="en-US"/>
-          </a:p>
-        </p:txBody>
-      </p:sp>
-    </p:spTree>
-    <p:extLst>
-      <p:ext uri="{BB962C8B-B14F-4D97-AF65-F5344CB8AC3E}">
-        <p14:creationId xmlns:p14="http://schemas.microsoft.com/office/powerpoint/2010/main" val="2711482279"/>
-      </p:ext>
-    </p:extLst>
-  </p:cSld>
-  <p:clrMapOvr>
-    <a:masterClrMapping/>
-  </p:clrMapOvr>
-</p:notes>
-</file>
-
-<file path=ppt/notesSlides/notesSlide3.xml><?xml version="1.0" encoding="utf-8"?>
-<p:notes xmlns:a="http://schemas.openxmlformats.org/drawingml/2006/main" xmlns:r="http://schemas.openxmlformats.org/officeDocument/2006/relationships" xmlns:p="http://schemas.openxmlformats.org/presentationml/2006/main">
-  <p:cSld>
-    <p:spTree>
-      <p:nvGrpSpPr>
-        <p:cNvPr id="1" name=""/>
-        <p:cNvGrpSpPr/>
-        <p:nvPr/>
-      </p:nvGrpSpPr>
-      <p:grpSpPr>
-        <a:xfrm>
-          <a:off x="0" y="0"/>
-          <a:ext cx="0" cy="0"/>
-          <a:chOff x="0" y="0"/>
-          <a:chExt cx="0" cy="0"/>
-        </a:xfrm>
-      </p:grpSpPr>
-      <p:sp>
-        <p:nvSpPr>
-          <p:cNvPr id="2" name="Slide Image Placeholder 1"/>
-          <p:cNvSpPr>
-            <a:spLocks noGrp="1" noRot="1" noChangeAspect="1"/>
-          </p:cNvSpPr>
-          <p:nvPr>
-            <p:ph type="sldImg"/>
-          </p:nvPr>
-        </p:nvSpPr>
-        <p:spPr/>
-      </p:sp>
-      <p:sp>
-        <p:nvSpPr>
-          <p:cNvPr id="3" name="Notes Placeholder 2"/>
-          <p:cNvSpPr>
-            <a:spLocks noGrp="1"/>
-          </p:cNvSpPr>
-          <p:nvPr>
-            <p:ph type="body" idx="1"/>
-          </p:nvPr>
-        </p:nvSpPr>
-        <p:spPr/>
-        <p:txBody>
-          <a:bodyPr/>
-          <a:lstStyle/>
-          <a:p>
-            <a:pPr marL="0" marR="0" indent="0" algn="l" defTabSz="914400" rtl="0" eaLnBrk="1" fontAlgn="base" latinLnBrk="0" hangingPunct="1">
-              <a:lnSpc>
-                <a:spcPct val="100000"/>
-              </a:lnSpc>
-              <a:spcBef>
-                <a:spcPct val="30000"/>
-              </a:spcBef>
-              <a:spcAft>
-                <a:spcPct val="0"/>
-              </a:spcAft>
-              <a:buClrTx/>
-              <a:buSzTx/>
-              <a:buFontTx/>
-              <a:buNone/>
-              <a:tabLst/>
-              <a:defRPr/>
-            </a:pPr>
-            <a:r>
-              <a:rPr lang="en-AU" dirty="0">
-                <a:latin typeface="Arial"/>
-                <a:cs typeface="Arial"/>
-              </a:rPr>
-              <a:t>This</a:t>
-            </a:r>
-            <a:r>
-              <a:rPr lang="en-AU" baseline="0" dirty="0">
-                <a:latin typeface="Arial"/>
-                <a:cs typeface="Arial"/>
-              </a:rPr>
-              <a:t> chart has been reviewed on 21/10/2016.</a:t>
-            </a:r>
-            <a:endParaRPr lang="en-AU" dirty="0">
-              <a:latin typeface="Arial"/>
-              <a:cs typeface="Arial"/>
-            </a:endParaRPr>
-          </a:p>
-          <a:p>
-            <a:endParaRPr lang="en-AU" dirty="0"/>
-          </a:p>
-          <a:p>
-            <a:r>
-              <a:rPr lang="en-AU" dirty="0"/>
-              <a:t>Title: </a:t>
-            </a:r>
-            <a:r>
-              <a:rPr lang="en-AU" sz="1200" kern="1200" baseline="0" dirty="0">
-                <a:solidFill>
-                  <a:schemeClr val="tx1"/>
-                </a:solidFill>
-                <a:effectLst/>
-                <a:latin typeface="Arial" charset="0"/>
-                <a:ea typeface="ＭＳ Ｐゴシック" pitchFamily="34" charset="-128"/>
-                <a:cs typeface="+mn-cs"/>
-              </a:rPr>
-              <a:t>Key risk measurement and management concepts</a:t>
-            </a:r>
-          </a:p>
-          <a:p>
-            <a:r>
-              <a:rPr lang="en-AU" sz="1200" kern="1200" baseline="0" dirty="0">
-                <a:solidFill>
-                  <a:schemeClr val="tx1"/>
-                </a:solidFill>
-                <a:effectLst/>
-                <a:latin typeface="Arial" charset="0"/>
-                <a:ea typeface="ＭＳ Ｐゴシック" pitchFamily="34" charset="-128"/>
-                <a:cs typeface="+mn-cs"/>
-              </a:rPr>
-              <a:t>Subtitle: Illustrative probability distribution of cost outcomes on individual projects, per cent</a:t>
-            </a:r>
-          </a:p>
-          <a:p>
-            <a:endParaRPr lang="en-AU" sz="1200" kern="1200" baseline="0" dirty="0">
-              <a:solidFill>
-                <a:schemeClr val="tx1"/>
-              </a:solidFill>
-              <a:effectLst/>
-              <a:latin typeface="Arial" charset="0"/>
-              <a:ea typeface="ＭＳ Ｐゴシック" pitchFamily="34" charset="-128"/>
-              <a:cs typeface="+mn-cs"/>
-            </a:endParaRPr>
-          </a:p>
-          <a:p>
-            <a:r>
-              <a:rPr lang="en-AU" sz="1200" kern="1200" baseline="0" dirty="0">
-                <a:solidFill>
-                  <a:schemeClr val="tx1"/>
-                </a:solidFill>
-                <a:effectLst/>
-                <a:latin typeface="Arial" charset="0"/>
-                <a:ea typeface="ＭＳ Ｐゴシック" pitchFamily="34" charset="-128"/>
-                <a:cs typeface="+mn-cs"/>
-              </a:rPr>
-              <a:t>Notes: </a:t>
-            </a:r>
-            <a:r>
-              <a:rPr lang="en-AU" sz="1200" i="1" kern="1200" baseline="0" dirty="0">
-                <a:solidFill>
-                  <a:schemeClr val="tx1"/>
-                </a:solidFill>
-                <a:effectLst/>
-                <a:latin typeface="Arial" charset="0"/>
-                <a:ea typeface="ＭＳ Ｐゴシック" pitchFamily="34" charset="-128"/>
-                <a:cs typeface="+mn-cs"/>
-              </a:rPr>
-              <a:t>The distribution of cost risks depicted is a stylized representation of the distribution of cost overruns observed in the Investment Monitor; see appendix xx for details. This graph’s illustrative purpose is to graphically present the relative distances between the median, 90</a:t>
-            </a:r>
-            <a:r>
-              <a:rPr lang="en-AU" sz="1200" i="1" kern="1200" baseline="30000" dirty="0">
-                <a:solidFill>
-                  <a:schemeClr val="tx1"/>
-                </a:solidFill>
-                <a:effectLst/>
-                <a:latin typeface="Arial" charset="0"/>
-                <a:ea typeface="ＭＳ Ｐゴシック" pitchFamily="34" charset="-128"/>
-                <a:cs typeface="+mn-cs"/>
-              </a:rPr>
-              <a:t>th</a:t>
-            </a:r>
-            <a:r>
-              <a:rPr lang="en-AU" sz="1200" i="1" kern="1200" baseline="0" dirty="0">
-                <a:solidFill>
-                  <a:schemeClr val="tx1"/>
-                </a:solidFill>
-                <a:effectLst/>
-                <a:latin typeface="Arial" charset="0"/>
-                <a:ea typeface="ＭＳ Ｐゴシック" pitchFamily="34" charset="-128"/>
-                <a:cs typeface="+mn-cs"/>
-              </a:rPr>
-              <a:t> quantile and expected value of cost overruns.</a:t>
-            </a:r>
-            <a:br>
-              <a:rPr lang="en-AU" sz="1200" i="1" kern="1200" baseline="0" dirty="0">
-                <a:solidFill>
-                  <a:schemeClr val="tx1"/>
-                </a:solidFill>
-                <a:effectLst/>
-                <a:latin typeface="Arial" charset="0"/>
-                <a:ea typeface="ＭＳ Ｐゴシック" pitchFamily="34" charset="-128"/>
-                <a:cs typeface="+mn-cs"/>
-              </a:rPr>
-            </a:br>
-            <a:endParaRPr lang="en-AU" sz="1200" kern="1200" baseline="0" dirty="0">
-              <a:solidFill>
-                <a:schemeClr val="tx1"/>
-              </a:solidFill>
-              <a:effectLst/>
-              <a:latin typeface="Arial" charset="0"/>
-              <a:ea typeface="ＭＳ Ｐゴシック" pitchFamily="34" charset="-128"/>
-              <a:cs typeface="+mn-cs"/>
-            </a:endParaRPr>
-          </a:p>
-          <a:p>
-            <a:r>
-              <a:rPr lang="en-AU" sz="1200" kern="1200" baseline="0" dirty="0">
-                <a:solidFill>
-                  <a:schemeClr val="tx1"/>
-                </a:solidFill>
-                <a:effectLst/>
-                <a:latin typeface="Arial" charset="0"/>
-                <a:ea typeface="ＭＳ Ｐゴシック" pitchFamily="34" charset="-128"/>
-                <a:cs typeface="+mn-cs"/>
-              </a:rPr>
-              <a:t>Sources: Deloitte Investment Monitor, Grattan analysis</a:t>
-            </a:r>
-            <a:endParaRPr lang="en-AU" dirty="0"/>
-          </a:p>
-        </p:txBody>
-      </p:sp>
-      <p:sp>
-        <p:nvSpPr>
-          <p:cNvPr id="4" name="Slide Number Placeholder 3"/>
-          <p:cNvSpPr>
-            <a:spLocks noGrp="1"/>
-          </p:cNvSpPr>
-          <p:nvPr>
-            <p:ph type="sldNum" sz="quarter" idx="10"/>
-          </p:nvPr>
-        </p:nvSpPr>
-        <p:spPr/>
-        <p:txBody>
-          <a:bodyPr/>
-          <a:lstStyle/>
-          <a:p>
-            <a:fld id="{EE67FFEB-41A8-4E33-A442-87C345D03039}" type="slidenum">
-              <a:rPr lang="en-US" smtClean="0"/>
-              <a:pPr/>
-              <a:t>10</a:t>
-            </a:fld>
-            <a:endParaRPr lang="en-US"/>
-          </a:p>
-        </p:txBody>
-      </p:sp>
-    </p:spTree>
-    <p:extLst>
-      <p:ext uri="{BB962C8B-B14F-4D97-AF65-F5344CB8AC3E}">
-        <p14:creationId xmlns:p14="http://schemas.microsoft.com/office/powerpoint/2010/main" val="2711482279"/>
-      </p:ext>
-    </p:extLst>
-  </p:cSld>
-  <p:clrMapOvr>
-    <a:masterClrMapping/>
-  </p:clrMapOvr>
-</p:notes>
-</file>
-
 <file path=ppt/slideLayouts/slideLayout1.xml><?xml version="1.0" encoding="utf-8"?>
 <p:sldLayout xmlns:a="http://schemas.openxmlformats.org/drawingml/2006/main" xmlns:r="http://schemas.openxmlformats.org/officeDocument/2006/relationships" xmlns:p="http://schemas.openxmlformats.org/presentationml/2006/main" showMasterSp="0" type="title" preserve="1">
   <p:cSld name="Title Slide">
@@ -4451,8 +3955,8 @@
         </p:nvSpPr>
         <p:spPr>
           <a:xfrm>
-            <a:off x="1928819" y="3213101"/>
-            <a:ext cx="7345363" cy="609600"/>
+            <a:off x="1928820" y="2361481"/>
+            <a:ext cx="7345363" cy="448028"/>
           </a:xfrm>
           <a:prstGeom prst="rect">
             <a:avLst/>
@@ -4486,8 +3990,8 @@
         </p:nvSpPr>
         <p:spPr>
           <a:xfrm>
-            <a:off x="1928819" y="4105284"/>
-            <a:ext cx="7345363" cy="365125"/>
+            <a:off x="1928820" y="3017194"/>
+            <a:ext cx="7345363" cy="268350"/>
           </a:xfrm>
           <a:prstGeom prst="rect">
             <a:avLst/>
@@ -4521,8 +4025,8 @@
         </p:nvSpPr>
         <p:spPr bwMode="auto">
           <a:xfrm>
-            <a:off x="495300" y="6245225"/>
-            <a:ext cx="2311400" cy="476250"/>
+            <a:off x="495300" y="4589952"/>
+            <a:ext cx="2311400" cy="350022"/>
           </a:xfrm>
           <a:prstGeom prst="rect">
             <a:avLst/>
@@ -4566,8 +4070,8 @@
         </p:nvSpPr>
         <p:spPr bwMode="auto">
           <a:xfrm>
-            <a:off x="3384550" y="6245225"/>
-            <a:ext cx="3136900" cy="476250"/>
+            <a:off x="3384550" y="4589952"/>
+            <a:ext cx="3136900" cy="350022"/>
           </a:xfrm>
           <a:prstGeom prst="rect">
             <a:avLst/>
@@ -4611,8 +4115,8 @@
         </p:nvSpPr>
         <p:spPr>
           <a:xfrm>
-            <a:off x="7099300" y="6245225"/>
-            <a:ext cx="2311400" cy="476250"/>
+            <a:off x="7099300" y="4589952"/>
+            <a:ext cx="2311400" cy="350022"/>
           </a:xfrm>
           <a:prstGeom prst="rect">
             <a:avLst/>
@@ -4660,8 +4164,8 @@
         </p:blipFill>
         <p:spPr bwMode="auto">
           <a:xfrm>
-            <a:off x="5024438" y="981075"/>
-            <a:ext cx="4249738" cy="1081088"/>
+            <a:off x="5024438" y="721045"/>
+            <a:ext cx="4249738" cy="794550"/>
           </a:xfrm>
           <a:prstGeom prst="rect">
             <a:avLst/>
@@ -4761,8 +4265,8 @@
         </p:nvSpPr>
         <p:spPr>
           <a:xfrm>
-            <a:off x="631849" y="455965"/>
-            <a:ext cx="6913563" cy="461616"/>
+            <a:off x="631850" y="335113"/>
+            <a:ext cx="6913563" cy="339266"/>
           </a:xfrm>
           <a:prstGeom prst="rect">
             <a:avLst/>
@@ -4796,8 +4300,8 @@
         </p:nvSpPr>
         <p:spPr>
           <a:xfrm>
-            <a:off x="631849" y="1076326"/>
-            <a:ext cx="8642349" cy="276950"/>
+            <a:off x="631850" y="791050"/>
+            <a:ext cx="8642349" cy="203545"/>
           </a:xfrm>
           <a:prstGeom prst="rect">
             <a:avLst/>
@@ -4831,8 +4335,8 @@
         </p:nvSpPr>
         <p:spPr>
           <a:xfrm>
-            <a:off x="582621" y="6261100"/>
-            <a:ext cx="8188324" cy="476250"/>
+            <a:off x="582621" y="4601619"/>
+            <a:ext cx="8188324" cy="350022"/>
           </a:xfrm>
           <a:prstGeom prst="rect">
             <a:avLst/>
@@ -4930,8 +4434,8 @@
         </p:nvSpPr>
         <p:spPr>
           <a:xfrm>
-            <a:off x="631836" y="548244"/>
-            <a:ext cx="6913563" cy="369332"/>
+            <a:off x="631837" y="402934"/>
+            <a:ext cx="6913563" cy="271442"/>
           </a:xfrm>
           <a:prstGeom prst="rect">
             <a:avLst/>
@@ -5080,8 +4584,8 @@
         </p:nvSpPr>
         <p:spPr>
           <a:xfrm>
-            <a:off x="631829" y="548244"/>
-            <a:ext cx="6913563" cy="369332"/>
+            <a:off x="631830" y="402934"/>
+            <a:ext cx="6913563" cy="271442"/>
           </a:xfrm>
           <a:prstGeom prst="rect">
             <a:avLst/>
@@ -5115,8 +4619,8 @@
         </p:nvSpPr>
         <p:spPr>
           <a:xfrm>
-            <a:off x="631825" y="1076325"/>
-            <a:ext cx="8642350" cy="184666"/>
+            <a:off x="631825" y="791049"/>
+            <a:ext cx="8642350" cy="135721"/>
           </a:xfrm>
           <a:prstGeom prst="rect">
             <a:avLst/>
@@ -5180,8 +4684,8 @@
         </p:nvSpPr>
         <p:spPr>
           <a:xfrm>
-            <a:off x="1928819" y="3213101"/>
-            <a:ext cx="7345363" cy="609600"/>
+            <a:off x="1928820" y="2361481"/>
+            <a:ext cx="7345363" cy="448028"/>
           </a:xfrm>
           <a:prstGeom prst="rect">
             <a:avLst/>
@@ -5215,8 +4719,8 @@
         </p:nvSpPr>
         <p:spPr>
           <a:xfrm>
-            <a:off x="1928819" y="4105284"/>
-            <a:ext cx="7345363" cy="365125"/>
+            <a:off x="1928820" y="3017194"/>
+            <a:ext cx="7345363" cy="268350"/>
           </a:xfrm>
           <a:prstGeom prst="rect">
             <a:avLst/>
@@ -5250,8 +4754,8 @@
         </p:nvSpPr>
         <p:spPr bwMode="auto">
           <a:xfrm>
-            <a:off x="495300" y="6245225"/>
-            <a:ext cx="2311400" cy="476250"/>
+            <a:off x="495300" y="4589952"/>
+            <a:ext cx="2311400" cy="350022"/>
           </a:xfrm>
           <a:prstGeom prst="rect">
             <a:avLst/>
@@ -5295,8 +4799,8 @@
         </p:nvSpPr>
         <p:spPr bwMode="auto">
           <a:xfrm>
-            <a:off x="3384550" y="6245225"/>
-            <a:ext cx="3136900" cy="476250"/>
+            <a:off x="3384550" y="4589952"/>
+            <a:ext cx="3136900" cy="350022"/>
           </a:xfrm>
           <a:prstGeom prst="rect">
             <a:avLst/>
@@ -5340,8 +4844,8 @@
         </p:nvSpPr>
         <p:spPr>
           <a:xfrm>
-            <a:off x="7099300" y="6245225"/>
-            <a:ext cx="2311400" cy="476250"/>
+            <a:off x="7099300" y="4589952"/>
+            <a:ext cx="2311400" cy="350022"/>
           </a:xfrm>
           <a:prstGeom prst="rect">
             <a:avLst/>
@@ -5389,8 +4893,8 @@
         </p:blipFill>
         <p:spPr bwMode="auto">
           <a:xfrm>
-            <a:off x="5024438" y="981075"/>
-            <a:ext cx="4249738" cy="1081088"/>
+            <a:off x="5024438" y="721045"/>
+            <a:ext cx="4249738" cy="794550"/>
           </a:xfrm>
           <a:prstGeom prst="rect">
             <a:avLst/>
@@ -5495,8 +4999,8 @@
         </p:nvSpPr>
         <p:spPr>
           <a:xfrm>
-            <a:off x="631834" y="642943"/>
-            <a:ext cx="6913563" cy="274637"/>
+            <a:off x="631835" y="472534"/>
+            <a:ext cx="6913563" cy="201846"/>
           </a:xfrm>
           <a:prstGeom prst="rect">
             <a:avLst/>
@@ -5530,8 +5034,8 @@
         </p:nvSpPr>
         <p:spPr>
           <a:xfrm>
-            <a:off x="631833" y="1076325"/>
-            <a:ext cx="8642349" cy="184666"/>
+            <a:off x="631834" y="791049"/>
+            <a:ext cx="8642349" cy="135721"/>
           </a:xfrm>
           <a:prstGeom prst="rect">
             <a:avLst/>
@@ -5625,8 +5129,8 @@
         </p:nvSpPr>
         <p:spPr>
           <a:xfrm>
-            <a:off x="631849" y="116632"/>
-            <a:ext cx="6913563" cy="461616"/>
+            <a:off x="631850" y="85719"/>
+            <a:ext cx="6913563" cy="339266"/>
           </a:xfrm>
           <a:prstGeom prst="rect">
             <a:avLst/>
@@ -5660,8 +5164,8 @@
         </p:nvSpPr>
         <p:spPr>
           <a:xfrm>
-            <a:off x="631849" y="692696"/>
-            <a:ext cx="8642349" cy="276950"/>
+            <a:off x="631850" y="509100"/>
+            <a:ext cx="8642349" cy="203545"/>
           </a:xfrm>
           <a:prstGeom prst="rect">
             <a:avLst/>
@@ -5695,8 +5199,8 @@
         </p:nvSpPr>
         <p:spPr>
           <a:xfrm>
-            <a:off x="582621" y="6261100"/>
-            <a:ext cx="8188324" cy="476250"/>
+            <a:off x="582621" y="4601619"/>
+            <a:ext cx="8188324" cy="350022"/>
           </a:xfrm>
           <a:prstGeom prst="rect">
             <a:avLst/>
@@ -5794,8 +5298,8 @@
         </p:nvSpPr>
         <p:spPr>
           <a:xfrm>
-            <a:off x="631836" y="548244"/>
-            <a:ext cx="6913563" cy="369332"/>
+            <a:off x="631837" y="402934"/>
+            <a:ext cx="6913563" cy="271442"/>
           </a:xfrm>
           <a:prstGeom prst="rect">
             <a:avLst/>
@@ -6816,7 +6320,7 @@
           </p:nvPr>
         </p:nvGraphicFramePr>
         <p:xfrm>
-          <a:off x="0" y="-28511"/>
+          <a:off x="0" y="-937355"/>
           <a:ext cx="9906000" cy="6750022"/>
         </p:xfrm>
         <a:graphic>
@@ -8491,7 +7995,7 @@
         </p:blipFill>
         <p:spPr bwMode="auto">
           <a:xfrm>
-            <a:off x="984278" y="980728"/>
+            <a:off x="984279" y="71885"/>
             <a:ext cx="8939595" cy="5316079"/>
           </a:xfrm>
           <a:prstGeom prst="rect">
@@ -8513,391 +8017,6 @@
     <p:extLst>
       <p:ext uri="{BB962C8B-B14F-4D97-AF65-F5344CB8AC3E}">
         <p14:creationId xmlns:p14="http://schemas.microsoft.com/office/powerpoint/2010/main" val="3586242254"/>
-      </p:ext>
-    </p:extLst>
-  </p:cSld>
-  <p:clrMapOvr>
-    <a:masterClrMapping/>
-  </p:clrMapOvr>
-</p:sld>
-</file>
-
-<file path=ppt/slides/slide10.xml><?xml version="1.0" encoding="utf-8"?>
-<p:sld xmlns:a="http://schemas.openxmlformats.org/drawingml/2006/main" xmlns:r="http://schemas.openxmlformats.org/officeDocument/2006/relationships" xmlns:p="http://schemas.openxmlformats.org/presentationml/2006/main">
-  <p:cSld>
-    <p:spTree>
-      <p:nvGrpSpPr>
-        <p:cNvPr id="1" name=""/>
-        <p:cNvGrpSpPr/>
-        <p:nvPr/>
-      </p:nvGrpSpPr>
-      <p:grpSpPr>
-        <a:xfrm>
-          <a:off x="0" y="0"/>
-          <a:ext cx="0" cy="0"/>
-          <a:chOff x="0" y="0"/>
-          <a:chExt cx="0" cy="0"/>
-        </a:xfrm>
-      </p:grpSpPr>
-      <p:pic>
-        <p:nvPicPr>
-          <p:cNvPr id="42" name="Picture 41"/>
-          <p:cNvPicPr>
-            <a:picLocks noChangeAspect="1"/>
-          </p:cNvPicPr>
-          <p:nvPr/>
-        </p:nvPicPr>
-        <p:blipFill rotWithShape="1">
-          <a:blip r:embed="rId3">
-            <a:extLst>
-              <a:ext uri="{BEBA8EAE-BF5A-486C-A8C5-ECC9F3942E4B}">
-                <a14:imgProps xmlns:a14="http://schemas.microsoft.com/office/drawing/2010/main">
-                  <a14:imgLayer r:embed="rId4">
-                    <a14:imgEffect>
-                      <a14:backgroundRemoval t="12140" b="82246" l="10270" r="94352">
-                        <a14:foregroundMark x1="32478" y1="24127" x2="32478" y2="24127"/>
-                        <a14:foregroundMark x1="32734" y1="26404" x2="32734" y2="26404"/>
-                        <a14:foregroundMark x1="35558" y1="45979" x2="35558" y2="45979"/>
-                        <a14:foregroundMark x1="35558" y1="47800" x2="35558" y2="47800"/>
-                        <a14:foregroundMark x1="35558" y1="49014" x2="35558" y2="49014"/>
-                        <a14:foregroundMark x1="27985" y1="15175" x2="27985" y2="15175"/>
-                        <a14:foregroundMark x1="27728" y1="16085" x2="27728" y2="16085"/>
-                        <a14:foregroundMark x1="27343" y1="17602" x2="27343" y2="17602"/>
-                        <a14:foregroundMark x1="29910" y1="13202" x2="29910" y2="13202"/>
-                        <a14:foregroundMark x1="30295" y1="14568" x2="30295" y2="14568"/>
-                        <a14:backgroundMark x1="27599" y1="32929" x2="27599" y2="32929"/>
-                      </a14:backgroundRemoval>
-                    </a14:imgEffect>
-                  </a14:imgLayer>
-                </a14:imgProps>
-              </a:ext>
-              <a:ext uri="{28A0092B-C50C-407E-A947-70E740481C1C}">
-                <a14:useLocalDpi xmlns:a14="http://schemas.microsoft.com/office/drawing/2010/main" val="0"/>
-              </a:ext>
-            </a:extLst>
-          </a:blip>
-          <a:srcRect l="10355" t="12384" r="5465" b="17903"/>
-          <a:stretch/>
-        </p:blipFill>
-        <p:spPr>
-          <a:xfrm>
-            <a:off x="357106" y="1049437"/>
-            <a:ext cx="7514569" cy="5440411"/>
-          </a:xfrm>
-          <a:prstGeom prst="rect">
-            <a:avLst/>
-          </a:prstGeom>
-        </p:spPr>
-      </p:pic>
-      <p:cxnSp>
-        <p:nvCxnSpPr>
-          <p:cNvPr id="10" name="Straight Arrow Connector 9"/>
-          <p:cNvCxnSpPr/>
-          <p:nvPr/>
-        </p:nvCxnSpPr>
-        <p:spPr bwMode="auto">
-          <a:xfrm>
-            <a:off x="337238" y="3263265"/>
-            <a:ext cx="9391093" cy="0"/>
-          </a:xfrm>
-          <a:prstGeom prst="straightConnector1">
-            <a:avLst/>
-          </a:prstGeom>
-          <a:solidFill>
-            <a:schemeClr val="accent1"/>
-          </a:solidFill>
-          <a:ln w="9525" cap="flat" cmpd="sng" algn="ctr">
-            <a:solidFill>
-              <a:schemeClr val="accent6">
-                <a:lumMod val="60000"/>
-                <a:lumOff val="40000"/>
-              </a:schemeClr>
-            </a:solidFill>
-            <a:prstDash val="solid"/>
-            <a:round/>
-            <a:headEnd type="none" w="med" len="med"/>
-            <a:tailEnd type="none" w="med" len="med"/>
-          </a:ln>
-          <a:effectLst/>
-        </p:spPr>
-      </p:cxnSp>
-      <p:cxnSp>
-        <p:nvCxnSpPr>
-          <p:cNvPr id="11" name="Straight Arrow Connector 10"/>
-          <p:cNvCxnSpPr/>
-          <p:nvPr/>
-        </p:nvCxnSpPr>
-        <p:spPr bwMode="auto">
-          <a:xfrm>
-            <a:off x="325054" y="5005596"/>
-            <a:ext cx="9403277" cy="0"/>
-          </a:xfrm>
-          <a:prstGeom prst="straightConnector1">
-            <a:avLst/>
-          </a:prstGeom>
-          <a:solidFill>
-            <a:schemeClr val="accent1"/>
-          </a:solidFill>
-          <a:ln w="9525" cap="flat" cmpd="sng" algn="ctr">
-            <a:solidFill>
-              <a:schemeClr val="accent6">
-                <a:lumMod val="60000"/>
-                <a:lumOff val="40000"/>
-              </a:schemeClr>
-            </a:solidFill>
-            <a:prstDash val="solid"/>
-            <a:round/>
-            <a:headEnd type="none" w="med" len="med"/>
-            <a:tailEnd type="none" w="med" len="med"/>
-          </a:ln>
-          <a:effectLst/>
-        </p:spPr>
-      </p:cxnSp>
-      <p:cxnSp>
-        <p:nvCxnSpPr>
-          <p:cNvPr id="12" name="Straight Arrow Connector 11"/>
-          <p:cNvCxnSpPr/>
-          <p:nvPr/>
-        </p:nvCxnSpPr>
-        <p:spPr bwMode="auto">
-          <a:xfrm flipV="1">
-            <a:off x="310835" y="1601976"/>
-            <a:ext cx="9417496" cy="2"/>
-          </a:xfrm>
-          <a:prstGeom prst="straightConnector1">
-            <a:avLst/>
-          </a:prstGeom>
-          <a:solidFill>
-            <a:schemeClr val="accent1"/>
-          </a:solidFill>
-          <a:ln w="9525" cap="flat" cmpd="sng" algn="ctr">
-            <a:solidFill>
-              <a:schemeClr val="accent6">
-                <a:lumMod val="60000"/>
-                <a:lumOff val="40000"/>
-              </a:schemeClr>
-            </a:solidFill>
-            <a:prstDash val="solid"/>
-            <a:round/>
-            <a:headEnd type="none" w="med" len="med"/>
-            <a:tailEnd type="none" w="med" len="med"/>
-          </a:ln>
-          <a:effectLst/>
-        </p:spPr>
-      </p:cxnSp>
-      <p:grpSp>
-        <p:nvGrpSpPr>
-          <p:cNvPr id="2055" name="Group 2054"/>
-          <p:cNvGrpSpPr/>
-          <p:nvPr/>
-        </p:nvGrpSpPr>
-        <p:grpSpPr>
-          <a:xfrm>
-            <a:off x="272480" y="4962021"/>
-            <a:ext cx="9520608" cy="1851358"/>
-            <a:chOff x="760984" y="4332040"/>
-            <a:chExt cx="8920045" cy="2457752"/>
-          </a:xfrm>
-        </p:grpSpPr>
-        <p:grpSp>
-          <p:nvGrpSpPr>
-            <p:cNvPr id="16" name="Group 15"/>
-            <p:cNvGrpSpPr/>
-            <p:nvPr/>
-          </p:nvGrpSpPr>
-          <p:grpSpPr>
-            <a:xfrm>
-              <a:off x="1096562" y="4332040"/>
-              <a:ext cx="3141109" cy="2457752"/>
-              <a:chOff x="1112114" y="4326870"/>
-              <a:chExt cx="3141109" cy="2457752"/>
-            </a:xfrm>
-          </p:grpSpPr>
-          <p:sp>
-            <p:nvSpPr>
-              <p:cNvPr id="17" name="TextBox 16"/>
-              <p:cNvSpPr txBox="1"/>
-              <p:nvPr/>
-            </p:nvSpPr>
-            <p:spPr>
-              <a:xfrm>
-                <a:off x="3784600" y="4326870"/>
-                <a:ext cx="466794" cy="261610"/>
-              </a:xfrm>
-              <a:prstGeom prst="rect">
-                <a:avLst/>
-              </a:prstGeom>
-              <a:noFill/>
-            </p:spPr>
-            <p:txBody>
-              <a:bodyPr wrap="none" rtlCol="0">
-                <a:spAutoFit/>
-              </a:bodyPr>
-              <a:lstStyle/>
-              <a:p>
-                <a:r>
-                  <a:rPr lang="en-AU" sz="1100" b="1" dirty="0">
-                    <a:solidFill>
-                      <a:schemeClr val="bg1"/>
-                    </a:solidFill>
-                  </a:rPr>
-                  <a:t>50%</a:t>
-                </a:r>
-              </a:p>
-            </p:txBody>
-          </p:sp>
-          <p:grpSp>
-            <p:nvGrpSpPr>
-              <p:cNvPr id="18" name="Group 17"/>
-              <p:cNvGrpSpPr/>
-              <p:nvPr/>
-            </p:nvGrpSpPr>
-            <p:grpSpPr>
-              <a:xfrm>
-                <a:off x="1112114" y="6346974"/>
-                <a:ext cx="3141109" cy="437648"/>
-                <a:chOff x="1184122" y="4675608"/>
-                <a:chExt cx="3141109" cy="437648"/>
-              </a:xfrm>
-            </p:grpSpPr>
-            <p:sp>
-              <p:nvSpPr>
-                <p:cNvPr id="21" name="TextBox 20"/>
-                <p:cNvSpPr txBox="1"/>
-                <p:nvPr/>
-              </p:nvSpPr>
-              <p:spPr>
-                <a:xfrm>
-                  <a:off x="2436190" y="4682368"/>
-                  <a:ext cx="420130" cy="430888"/>
-                </a:xfrm>
-                <a:prstGeom prst="rect">
-                  <a:avLst/>
-                </a:prstGeom>
-                <a:noFill/>
-                <a:ln>
-                  <a:noFill/>
-                  <a:headEnd type="none" w="med" len="med"/>
-                  <a:tailEnd type="none" w="med" len="med"/>
-                </a:ln>
-              </p:spPr>
-              <p:txBody>
-                <a:bodyPr wrap="square" rtlCol="0">
-                  <a:spAutoFit/>
-                </a:bodyPr>
-                <a:lstStyle/>
-                <a:p>
-                  <a:r>
-                    <a:rPr lang="en-AU" sz="2200" dirty="0"/>
-                    <a:t>1</a:t>
-                  </a:r>
-                </a:p>
-              </p:txBody>
-            </p:sp>
-            <p:sp>
-              <p:nvSpPr>
-                <p:cNvPr id="25" name="TextBox 24"/>
-                <p:cNvSpPr txBox="1"/>
-                <p:nvPr/>
-              </p:nvSpPr>
-              <p:spPr>
-                <a:xfrm>
-                  <a:off x="1184122" y="4675608"/>
-                  <a:ext cx="1548615" cy="430888"/>
-                </a:xfrm>
-                <a:prstGeom prst="rect">
-                  <a:avLst/>
-                </a:prstGeom>
-                <a:noFill/>
-                <a:ln>
-                  <a:noFill/>
-                  <a:headEnd type="none" w="med" len="med"/>
-                  <a:tailEnd type="none" w="med" len="med"/>
-                </a:ln>
-              </p:spPr>
-              <p:txBody>
-                <a:bodyPr wrap="square" rtlCol="0">
-                  <a:spAutoFit/>
-                </a:bodyPr>
-                <a:lstStyle/>
-                <a:p>
-                  <a:r>
-                    <a:rPr lang="en-AU" sz="2200" dirty="0"/>
-                    <a:t>Underrun</a:t>
-                  </a:r>
-                </a:p>
-              </p:txBody>
-            </p:sp>
-            <p:sp>
-              <p:nvSpPr>
-                <p:cNvPr id="26" name="TextBox 25"/>
-                <p:cNvSpPr txBox="1"/>
-                <p:nvPr/>
-              </p:nvSpPr>
-              <p:spPr>
-                <a:xfrm>
-                  <a:off x="2776616" y="4682369"/>
-                  <a:ext cx="1548615" cy="430887"/>
-                </a:xfrm>
-                <a:prstGeom prst="rect">
-                  <a:avLst/>
-                </a:prstGeom>
-                <a:noFill/>
-                <a:ln>
-                  <a:noFill/>
-                  <a:headEnd type="none" w="med" len="med"/>
-                  <a:tailEnd type="none" w="med" len="med"/>
-                </a:ln>
-              </p:spPr>
-              <p:txBody>
-                <a:bodyPr wrap="square" rtlCol="0">
-                  <a:spAutoFit/>
-                </a:bodyPr>
-                <a:lstStyle/>
-                <a:p>
-                  <a:r>
-                    <a:rPr lang="en-AU" sz="2200" dirty="0"/>
-                    <a:t>Overrun</a:t>
-                  </a:r>
-                </a:p>
-              </p:txBody>
-            </p:sp>
-          </p:grpSp>
-        </p:grpSp>
-        <p:cxnSp>
-          <p:nvCxnSpPr>
-            <p:cNvPr id="29" name="Straight Connector 28"/>
-            <p:cNvCxnSpPr/>
-            <p:nvPr/>
-          </p:nvCxnSpPr>
-          <p:spPr bwMode="auto">
-            <a:xfrm>
-              <a:off x="760984" y="6381328"/>
-              <a:ext cx="8920045" cy="0"/>
-            </a:xfrm>
-            <a:prstGeom prst="line">
-              <a:avLst/>
-            </a:prstGeom>
-            <a:solidFill>
-              <a:schemeClr val="accent1"/>
-            </a:solidFill>
-            <a:ln w="9525" cap="flat" cmpd="sng" algn="ctr">
-              <a:solidFill>
-                <a:schemeClr val="accent6"/>
-              </a:solidFill>
-              <a:prstDash val="solid"/>
-              <a:round/>
-              <a:headEnd type="none" w="med" len="med"/>
-              <a:tailEnd type="none" w="med" len="med"/>
-            </a:ln>
-            <a:effectLst/>
-          </p:spPr>
-        </p:cxnSp>
-      </p:grpSp>
-    </p:spTree>
-    <p:extLst>
-      <p:ext uri="{BB962C8B-B14F-4D97-AF65-F5344CB8AC3E}">
-        <p14:creationId xmlns:p14="http://schemas.microsoft.com/office/powerpoint/2010/main" val="1366311812"/>
       </p:ext>
     </p:extLst>
   </p:cSld>
@@ -8939,7 +8058,7 @@
           </p:nvPr>
         </p:nvGraphicFramePr>
         <p:xfrm>
-          <a:off x="-15552" y="2420888"/>
+          <a:off x="-15552" y="1512044"/>
           <a:ext cx="9921553" cy="1872208"/>
         </p:xfrm>
         <a:graphic>
@@ -11695,7 +10814,7 @@
         </p:nvCxnSpPr>
         <p:spPr bwMode="auto">
           <a:xfrm>
-            <a:off x="848544" y="2931383"/>
+            <a:off x="560513" y="1541304"/>
             <a:ext cx="9067023" cy="0"/>
           </a:xfrm>
           <a:prstGeom prst="straightConnector1">
@@ -11727,7 +10846,7 @@
         </p:nvCxnSpPr>
         <p:spPr bwMode="auto">
           <a:xfrm>
-            <a:off x="848544" y="4535354"/>
+            <a:off x="560513" y="2981464"/>
             <a:ext cx="9067023" cy="0"/>
           </a:xfrm>
           <a:prstGeom prst="straightConnector1">
@@ -11759,7 +10878,7 @@
         </p:nvCxnSpPr>
         <p:spPr bwMode="auto">
           <a:xfrm>
-            <a:off x="820675" y="1386257"/>
+            <a:off x="532644" y="101144"/>
             <a:ext cx="9067023" cy="0"/>
           </a:xfrm>
           <a:prstGeom prst="straightConnector1">
@@ -11791,7 +10910,7 @@
         </p:nvSpPr>
         <p:spPr>
           <a:xfrm>
-            <a:off x="886566" y="1988841"/>
+            <a:off x="598534" y="249735"/>
             <a:ext cx="8935242" cy="4398926"/>
           </a:xfrm>
           <a:custGeom>
@@ -11899,7 +11018,7 @@
         </p:nvSpPr>
         <p:spPr>
           <a:xfrm>
-            <a:off x="3023982" y="1556792"/>
+            <a:off x="3095336" y="168023"/>
             <a:ext cx="2865122" cy="430887"/>
           </a:xfrm>
           <a:prstGeom prst="rect">
@@ -11932,7 +11051,7 @@
         </p:nvSpPr>
         <p:spPr bwMode="auto">
           <a:xfrm>
-            <a:off x="917498" y="2630389"/>
+            <a:off x="629466" y="891283"/>
             <a:ext cx="8644014" cy="3757378"/>
           </a:xfrm>
           <a:custGeom>
@@ -12020,33 +11139,7 @@
           </a:bodyPr>
           <a:lstStyle/>
           <a:p>
-            <a:pPr marL="0" marR="0" indent="0" algn="l" defTabSz="914400" rtl="0" eaLnBrk="0" fontAlgn="base" latinLnBrk="0" hangingPunct="0">
-              <a:lnSpc>
-                <a:spcPct val="100000"/>
-              </a:lnSpc>
-              <a:spcBef>
-                <a:spcPct val="0"/>
-              </a:spcBef>
-              <a:spcAft>
-                <a:spcPct val="0"/>
-              </a:spcAft>
-              <a:buClrTx/>
-              <a:buSzTx/>
-              <a:buFontTx/>
-              <a:buNone/>
-              <a:tabLst/>
-            </a:pPr>
-            <a:endParaRPr kumimoji="0" lang="en-AU" sz="2400" b="0" i="0" u="none" strike="noStrike" cap="none" normalizeH="0" baseline="0">
-              <a:ln>
-                <a:noFill/>
-              </a:ln>
-              <a:solidFill>
-                <a:schemeClr val="tx1"/>
-              </a:solidFill>
-              <a:effectLst/>
-              <a:latin typeface="Arial" charset="0"/>
-              <a:ea typeface="ＭＳ Ｐゴシック" pitchFamily="34" charset="-128"/>
-            </a:endParaRPr>
+            <a:endParaRPr lang="en-AU"/>
           </a:p>
         </p:txBody>
       </p:sp>
@@ -12058,7 +11151,7 @@
         </p:nvSpPr>
         <p:spPr>
           <a:xfrm>
-            <a:off x="4931673" y="2151289"/>
+            <a:off x="4756822" y="742693"/>
             <a:ext cx="3097871" cy="769441"/>
           </a:xfrm>
           <a:prstGeom prst="rect">
@@ -12092,7 +11185,7 @@
         </p:nvCxnSpPr>
         <p:spPr bwMode="auto">
           <a:xfrm flipH="1">
-            <a:off x="4232920" y="4188303"/>
+            <a:off x="3944888" y="2449198"/>
             <a:ext cx="1166018" cy="1"/>
           </a:xfrm>
           <a:prstGeom prst="straightConnector1">
@@ -12121,7 +11214,7 @@
         </p:nvGrpSpPr>
         <p:grpSpPr>
           <a:xfrm>
-            <a:off x="776536" y="6371426"/>
+            <a:off x="488504" y="4632320"/>
             <a:ext cx="9057456" cy="503726"/>
             <a:chOff x="848544" y="4700060"/>
             <a:chExt cx="9057456" cy="503726"/>
@@ -12291,13 +11384,13 @@
       </p:grpSpPr>
       <p:cxnSp>
         <p:nvCxnSpPr>
-          <p:cNvPr id="31" name="Straight Arrow Connector 30"/>
+          <p:cNvPr id="22" name="Straight Arrow Connector 21"/>
           <p:cNvCxnSpPr/>
           <p:nvPr/>
         </p:nvCxnSpPr>
         <p:spPr bwMode="auto">
           <a:xfrm>
-            <a:off x="848544" y="2931383"/>
+            <a:off x="560513" y="1541304"/>
             <a:ext cx="9067023" cy="0"/>
           </a:xfrm>
           <a:prstGeom prst="straightConnector1">
@@ -12323,13 +11416,13 @@
       </p:cxnSp>
       <p:cxnSp>
         <p:nvCxnSpPr>
-          <p:cNvPr id="40" name="Straight Arrow Connector 39"/>
+          <p:cNvPr id="23" name="Straight Arrow Connector 22"/>
           <p:cNvCxnSpPr/>
           <p:nvPr/>
         </p:nvCxnSpPr>
         <p:spPr bwMode="auto">
           <a:xfrm>
-            <a:off x="848544" y="4535354"/>
+            <a:off x="560513" y="2981464"/>
             <a:ext cx="9067023" cy="0"/>
           </a:xfrm>
           <a:prstGeom prst="straightConnector1">
@@ -12355,13 +11448,13 @@
       </p:cxnSp>
       <p:cxnSp>
         <p:nvCxnSpPr>
-          <p:cNvPr id="41" name="Straight Arrow Connector 40"/>
+          <p:cNvPr id="33" name="Straight Arrow Connector 32"/>
           <p:cNvCxnSpPr/>
           <p:nvPr/>
         </p:nvCxnSpPr>
         <p:spPr bwMode="auto">
           <a:xfrm>
-            <a:off x="820675" y="1386257"/>
+            <a:off x="532644" y="101144"/>
             <a:ext cx="9067023" cy="0"/>
           </a:xfrm>
           <a:prstGeom prst="straightConnector1">
@@ -12387,137 +11480,13 @@
       </p:cxnSp>
       <p:sp>
         <p:nvSpPr>
-          <p:cNvPr id="19" name="Freeform 18"/>
-          <p:cNvSpPr/>
-          <p:nvPr/>
-        </p:nvSpPr>
-        <p:spPr bwMode="auto">
-          <a:xfrm>
-            <a:off x="698278" y="2536009"/>
-            <a:ext cx="8935242" cy="4061343"/>
-          </a:xfrm>
-          <a:custGeom>
-            <a:avLst/>
-            <a:gdLst>
-              <a:gd name="connsiteX0" fmla="*/ 0 w 6886575"/>
-              <a:gd name="connsiteY0" fmla="*/ 3048862 h 3048862"/>
-              <a:gd name="connsiteX1" fmla="*/ 676275 w 6886575"/>
-              <a:gd name="connsiteY1" fmla="*/ 2134462 h 3048862"/>
-              <a:gd name="connsiteX2" fmla="*/ 1885950 w 6886575"/>
-              <a:gd name="connsiteY2" fmla="*/ 862 h 3048862"/>
-              <a:gd name="connsiteX3" fmla="*/ 3400425 w 6886575"/>
-              <a:gd name="connsiteY3" fmla="*/ 1886812 h 3048862"/>
-              <a:gd name="connsiteX4" fmla="*/ 6886575 w 6886575"/>
-              <a:gd name="connsiteY4" fmla="*/ 2858362 h 3048862"/>
-            </a:gdLst>
-            <a:ahLst/>
-            <a:cxnLst>
-              <a:cxn ang="0">
-                <a:pos x="connsiteX0" y="connsiteY0"/>
-              </a:cxn>
-              <a:cxn ang="0">
-                <a:pos x="connsiteX1" y="connsiteY1"/>
-              </a:cxn>
-              <a:cxn ang="0">
-                <a:pos x="connsiteX2" y="connsiteY2"/>
-              </a:cxn>
-              <a:cxn ang="0">
-                <a:pos x="connsiteX3" y="connsiteY3"/>
-              </a:cxn>
-              <a:cxn ang="0">
-                <a:pos x="connsiteX4" y="connsiteY4"/>
-              </a:cxn>
-            </a:cxnLst>
-            <a:rect l="l" t="t" r="r" b="b"/>
-            <a:pathLst>
-              <a:path w="6886575" h="3048862">
-                <a:moveTo>
-                  <a:pt x="0" y="3048862"/>
-                </a:moveTo>
-                <a:cubicBezTo>
-                  <a:pt x="180975" y="2845662"/>
-                  <a:pt x="361950" y="2642462"/>
-                  <a:pt x="676275" y="2134462"/>
-                </a:cubicBezTo>
-                <a:cubicBezTo>
-                  <a:pt x="990600" y="1626462"/>
-                  <a:pt x="1431925" y="42137"/>
-                  <a:pt x="1885950" y="862"/>
-                </a:cubicBezTo>
-                <a:cubicBezTo>
-                  <a:pt x="2339975" y="-40413"/>
-                  <a:pt x="2566988" y="1410562"/>
-                  <a:pt x="3400425" y="1886812"/>
-                </a:cubicBezTo>
-                <a:cubicBezTo>
-                  <a:pt x="4233863" y="2363062"/>
-                  <a:pt x="5560219" y="2610712"/>
-                  <a:pt x="6886575" y="2858362"/>
-                </a:cubicBezTo>
-              </a:path>
-            </a:pathLst>
-          </a:custGeom>
-          <a:noFill/>
-          <a:ln w="28575" cap="flat" cmpd="sng" algn="ctr">
-            <a:solidFill>
-              <a:srgbClr val="D4582A">
-                <a:alpha val="34902"/>
-              </a:srgbClr>
-            </a:solidFill>
-            <a:prstDash val="dash"/>
-            <a:round/>
-            <a:headEnd type="none" w="med" len="med"/>
-            <a:tailEnd type="none" w="med" len="med"/>
-          </a:ln>
-          <a:effectLst/>
-        </p:spPr>
-        <p:txBody>
-          <a:bodyPr vert="horz" wrap="square" lIns="91440" tIns="45720" rIns="91440" bIns="45720" numCol="1" rtlCol="0" anchor="t" anchorCtr="0" compatLnSpc="1">
-            <a:prstTxWarp prst="textNoShape">
-              <a:avLst/>
-            </a:prstTxWarp>
-          </a:bodyPr>
-          <a:lstStyle/>
-          <a:p>
-            <a:pPr marL="0" marR="0" indent="0" algn="l" defTabSz="914400" rtl="0" eaLnBrk="0" fontAlgn="base" latinLnBrk="0" hangingPunct="0">
-              <a:lnSpc>
-                <a:spcPct val="100000"/>
-              </a:lnSpc>
-              <a:spcBef>
-                <a:spcPct val="0"/>
-              </a:spcBef>
-              <a:spcAft>
-                <a:spcPct val="0"/>
-              </a:spcAft>
-              <a:buClrTx/>
-              <a:buSzTx/>
-              <a:buFontTx/>
-              <a:buNone/>
-              <a:tabLst/>
-            </a:pPr>
-            <a:endParaRPr kumimoji="0" lang="en-AU" sz="2400" b="0" i="0" u="none" strike="noStrike" cap="none" normalizeH="0" baseline="0">
-              <a:ln>
-                <a:noFill/>
-              </a:ln>
-              <a:solidFill>
-                <a:schemeClr val="tx1"/>
-              </a:solidFill>
-              <a:effectLst/>
-              <a:latin typeface="Arial" charset="0"/>
-              <a:ea typeface="ＭＳ Ｐゴシック" pitchFamily="34" charset="-128"/>
-            </a:endParaRPr>
-          </a:p>
-        </p:txBody>
-      </p:sp>
-      <p:sp>
-        <p:nvSpPr>
           <p:cNvPr id="2" name="Rectangle 1"/>
           <p:cNvSpPr/>
           <p:nvPr/>
         </p:nvSpPr>
         <p:spPr bwMode="auto">
           <a:xfrm>
-            <a:off x="2723826" y="2536008"/>
+            <a:off x="2370036" y="810391"/>
             <a:ext cx="933030" cy="363479"/>
           </a:xfrm>
           <a:prstGeom prst="rect">
@@ -12545,33 +11514,7 @@
           </a:bodyPr>
           <a:lstStyle/>
           <a:p>
-            <a:pPr marL="0" marR="0" indent="0" algn="l" defTabSz="914400" rtl="0" eaLnBrk="0" fontAlgn="base" latinLnBrk="0" hangingPunct="0">
-              <a:lnSpc>
-                <a:spcPct val="100000"/>
-              </a:lnSpc>
-              <a:spcBef>
-                <a:spcPct val="0"/>
-              </a:spcBef>
-              <a:spcAft>
-                <a:spcPct val="0"/>
-              </a:spcAft>
-              <a:buClrTx/>
-              <a:buSzTx/>
-              <a:buFontTx/>
-              <a:buNone/>
-              <a:tabLst/>
-            </a:pPr>
-            <a:endParaRPr kumimoji="0" lang="en-AU" sz="2400" b="0" i="0" u="none" strike="noStrike" cap="none" normalizeH="0" baseline="0">
-              <a:ln>
-                <a:noFill/>
-              </a:ln>
-              <a:solidFill>
-                <a:schemeClr val="tx1"/>
-              </a:solidFill>
-              <a:effectLst/>
-              <a:latin typeface="Arial" charset="0"/>
-              <a:ea typeface="ＭＳ Ｐゴシック" pitchFamily="34" charset="-128"/>
-            </a:endParaRPr>
+            <a:endParaRPr lang="en-AU"/>
           </a:p>
         </p:txBody>
       </p:sp>
@@ -12583,7 +11526,7 @@
         </p:nvSpPr>
         <p:spPr>
           <a:xfrm>
-            <a:off x="886566" y="1988841"/>
+            <a:off x="532776" y="263223"/>
             <a:ext cx="8935242" cy="4398926"/>
           </a:xfrm>
           <a:custGeom>
@@ -12691,7 +11634,7 @@
         </p:nvSpPr>
         <p:spPr>
           <a:xfrm>
-            <a:off x="2821467" y="1556792"/>
+            <a:off x="3041769" y="272701"/>
             <a:ext cx="2865122" cy="430887"/>
           </a:xfrm>
           <a:prstGeom prst="rect">
@@ -12724,7 +11667,7 @@
         </p:nvSpPr>
         <p:spPr>
           <a:xfrm>
-            <a:off x="6751673" y="5085184"/>
+            <a:off x="6397884" y="3359567"/>
             <a:ext cx="2881847" cy="769441"/>
           </a:xfrm>
           <a:prstGeom prst="rect">
@@ -12773,7 +11716,7 @@
         </p:nvGrpSpPr>
         <p:grpSpPr>
           <a:xfrm>
-            <a:off x="776536" y="6371426"/>
+            <a:off x="422746" y="4645808"/>
             <a:ext cx="9057456" cy="503726"/>
             <a:chOff x="848544" y="4700060"/>
             <a:chExt cx="9057456" cy="503726"/>
@@ -12919,7 +11862,7 @@
         </p:nvSpPr>
         <p:spPr bwMode="auto">
           <a:xfrm>
-            <a:off x="698278" y="6387767"/>
+            <a:off x="344488" y="4662150"/>
             <a:ext cx="188288" cy="271941"/>
           </a:xfrm>
           <a:prstGeom prst="rect">
@@ -12947,33 +11890,7 @@
           </a:bodyPr>
           <a:lstStyle/>
           <a:p>
-            <a:pPr marL="0" marR="0" indent="0" algn="l" defTabSz="914400" rtl="0" eaLnBrk="0" fontAlgn="base" latinLnBrk="0" hangingPunct="0">
-              <a:lnSpc>
-                <a:spcPct val="100000"/>
-              </a:lnSpc>
-              <a:spcBef>
-                <a:spcPct val="0"/>
-              </a:spcBef>
-              <a:spcAft>
-                <a:spcPct val="0"/>
-              </a:spcAft>
-              <a:buClrTx/>
-              <a:buSzTx/>
-              <a:buFontTx/>
-              <a:buNone/>
-              <a:tabLst/>
-            </a:pPr>
-            <a:endParaRPr kumimoji="0" lang="en-AU" sz="2400" b="0" i="0" u="none" strike="noStrike" cap="none" normalizeH="0" baseline="0">
-              <a:ln>
-                <a:noFill/>
-              </a:ln>
-              <a:solidFill>
-                <a:schemeClr val="tx1"/>
-              </a:solidFill>
-              <a:effectLst/>
-              <a:latin typeface="Arial" charset="0"/>
-              <a:ea typeface="ＭＳ Ｐゴシック" pitchFamily="34" charset="-128"/>
-            </a:endParaRPr>
+            <a:endParaRPr lang="en-AU"/>
           </a:p>
         </p:txBody>
       </p:sp>
@@ -12985,7 +11902,7 @@
         </p:nvCxnSpPr>
         <p:spPr bwMode="auto">
           <a:xfrm flipH="1">
-            <a:off x="5555174" y="5589240"/>
+            <a:off x="5201385" y="3863622"/>
             <a:ext cx="549953" cy="0"/>
           </a:xfrm>
           <a:prstGeom prst="straightConnector1">
@@ -13016,7 +11933,7 @@
         </p:nvCxnSpPr>
         <p:spPr bwMode="auto">
           <a:xfrm>
-            <a:off x="1424608" y="5589240"/>
+            <a:off x="1070819" y="3863622"/>
             <a:ext cx="432049" cy="0"/>
           </a:xfrm>
           <a:prstGeom prst="straightConnector1">
@@ -13039,6 +11956,104 @@
           <a:effectLst/>
         </p:spPr>
       </p:cxnSp>
+      <p:sp>
+        <p:nvSpPr>
+          <p:cNvPr id="19" name="Freeform 18"/>
+          <p:cNvSpPr/>
+          <p:nvPr/>
+        </p:nvSpPr>
+        <p:spPr bwMode="auto">
+          <a:xfrm>
+            <a:off x="344488" y="810392"/>
+            <a:ext cx="8935242" cy="4061343"/>
+          </a:xfrm>
+          <a:custGeom>
+            <a:avLst/>
+            <a:gdLst>
+              <a:gd name="connsiteX0" fmla="*/ 0 w 6886575"/>
+              <a:gd name="connsiteY0" fmla="*/ 3048862 h 3048862"/>
+              <a:gd name="connsiteX1" fmla="*/ 676275 w 6886575"/>
+              <a:gd name="connsiteY1" fmla="*/ 2134462 h 3048862"/>
+              <a:gd name="connsiteX2" fmla="*/ 1885950 w 6886575"/>
+              <a:gd name="connsiteY2" fmla="*/ 862 h 3048862"/>
+              <a:gd name="connsiteX3" fmla="*/ 3400425 w 6886575"/>
+              <a:gd name="connsiteY3" fmla="*/ 1886812 h 3048862"/>
+              <a:gd name="connsiteX4" fmla="*/ 6886575 w 6886575"/>
+              <a:gd name="connsiteY4" fmla="*/ 2858362 h 3048862"/>
+            </a:gdLst>
+            <a:ahLst/>
+            <a:cxnLst>
+              <a:cxn ang="0">
+                <a:pos x="connsiteX0" y="connsiteY0"/>
+              </a:cxn>
+              <a:cxn ang="0">
+                <a:pos x="connsiteX1" y="connsiteY1"/>
+              </a:cxn>
+              <a:cxn ang="0">
+                <a:pos x="connsiteX2" y="connsiteY2"/>
+              </a:cxn>
+              <a:cxn ang="0">
+                <a:pos x="connsiteX3" y="connsiteY3"/>
+              </a:cxn>
+              <a:cxn ang="0">
+                <a:pos x="connsiteX4" y="connsiteY4"/>
+              </a:cxn>
+            </a:cxnLst>
+            <a:rect l="l" t="t" r="r" b="b"/>
+            <a:pathLst>
+              <a:path w="6886575" h="3048862">
+                <a:moveTo>
+                  <a:pt x="0" y="3048862"/>
+                </a:moveTo>
+                <a:cubicBezTo>
+                  <a:pt x="180975" y="2845662"/>
+                  <a:pt x="361950" y="2642462"/>
+                  <a:pt x="676275" y="2134462"/>
+                </a:cubicBezTo>
+                <a:cubicBezTo>
+                  <a:pt x="990600" y="1626462"/>
+                  <a:pt x="1431925" y="42137"/>
+                  <a:pt x="1885950" y="862"/>
+                </a:cubicBezTo>
+                <a:cubicBezTo>
+                  <a:pt x="2339975" y="-40413"/>
+                  <a:pt x="2566988" y="1410562"/>
+                  <a:pt x="3400425" y="1886812"/>
+                </a:cubicBezTo>
+                <a:cubicBezTo>
+                  <a:pt x="4233863" y="2363062"/>
+                  <a:pt x="5560219" y="2610712"/>
+                  <a:pt x="6886575" y="2858362"/>
+                </a:cubicBezTo>
+              </a:path>
+            </a:pathLst>
+          </a:custGeom>
+          <a:noFill/>
+          <a:ln w="28575" cap="flat" cmpd="sng" algn="ctr">
+            <a:solidFill>
+              <a:srgbClr val="D4582A">
+                <a:alpha val="34902"/>
+              </a:srgbClr>
+            </a:solidFill>
+            <a:prstDash val="dash"/>
+            <a:round/>
+            <a:headEnd type="none" w="med" len="med"/>
+            <a:tailEnd type="none" w="med" len="med"/>
+          </a:ln>
+          <a:effectLst/>
+        </p:spPr>
+        <p:txBody>
+          <a:bodyPr vert="horz" wrap="square" lIns="91440" tIns="45720" rIns="91440" bIns="45720" numCol="1" rtlCol="0" anchor="t" anchorCtr="0" compatLnSpc="1">
+            <a:prstTxWarp prst="textNoShape">
+              <a:avLst/>
+            </a:prstTxWarp>
+          </a:bodyPr>
+          <a:lstStyle/>
+          <a:p>
+            <a:endParaRPr lang="en-AU"/>
+          </a:p>
+        </p:txBody>
+      </p:sp>
     </p:spTree>
     <p:extLst>
       <p:ext uri="{BB962C8B-B14F-4D97-AF65-F5344CB8AC3E}">
@@ -13077,7 +12092,7 @@
         </p:nvSpPr>
         <p:spPr bwMode="auto">
           <a:xfrm>
-            <a:off x="774357" y="116632"/>
+            <a:off x="500277" y="-1663623"/>
             <a:ext cx="2394917" cy="6305690"/>
           </a:xfrm>
           <a:prstGeom prst="rect">
@@ -13106,132 +12121,10 @@
           </a:bodyPr>
           <a:lstStyle/>
           <a:p>
-            <a:pPr marL="0" marR="0" indent="0" algn="l" defTabSz="914400" rtl="0" eaLnBrk="0" fontAlgn="base" latinLnBrk="0" hangingPunct="0">
-              <a:lnSpc>
-                <a:spcPct val="100000"/>
-              </a:lnSpc>
-              <a:spcBef>
-                <a:spcPct val="0"/>
-              </a:spcBef>
-              <a:spcAft>
-                <a:spcPct val="0"/>
-              </a:spcAft>
-              <a:buClrTx/>
-              <a:buSzTx/>
-              <a:buFontTx/>
-              <a:buNone/>
-              <a:tabLst/>
-            </a:pPr>
-            <a:endParaRPr kumimoji="0" lang="en-AU" sz="2400" b="0" i="0" u="none" strike="noStrike" cap="none" normalizeH="0" baseline="0">
-              <a:ln>
-                <a:noFill/>
-              </a:ln>
-              <a:solidFill>
-                <a:schemeClr val="tx1"/>
-              </a:solidFill>
-              <a:effectLst/>
-              <a:latin typeface="Arial" charset="0"/>
-              <a:ea typeface="ＭＳ Ｐゴシック" pitchFamily="34" charset="-128"/>
-            </a:endParaRPr>
+            <a:endParaRPr lang="en-AU"/>
           </a:p>
         </p:txBody>
       </p:sp>
-      <p:cxnSp>
-        <p:nvCxnSpPr>
-          <p:cNvPr id="25" name="Straight Arrow Connector 24"/>
-          <p:cNvCxnSpPr/>
-          <p:nvPr/>
-        </p:nvCxnSpPr>
-        <p:spPr bwMode="auto">
-          <a:xfrm flipV="1">
-            <a:off x="776536" y="2876862"/>
-            <a:ext cx="9057456" cy="9902"/>
-          </a:xfrm>
-          <a:prstGeom prst="straightConnector1">
-            <a:avLst/>
-          </a:prstGeom>
-          <a:solidFill>
-            <a:schemeClr val="accent1"/>
-          </a:solidFill>
-          <a:ln w="9525" cap="flat" cmpd="sng" algn="ctr">
-            <a:solidFill>
-              <a:schemeClr val="accent6">
-                <a:lumMod val="60000"/>
-                <a:lumOff val="40000"/>
-              </a:schemeClr>
-            </a:solidFill>
-            <a:prstDash val="solid"/>
-            <a:round/>
-            <a:headEnd type="none" w="med" len="med"/>
-            <a:tailEnd type="none" w="med" len="med"/>
-          </a:ln>
-          <a:effectLst/>
-        </p:spPr>
-      </p:cxnSp>
-      <p:cxnSp>
-        <p:nvCxnSpPr>
-          <p:cNvPr id="26" name="Straight Arrow Connector 25"/>
-          <p:cNvCxnSpPr/>
-          <p:nvPr/>
-        </p:nvCxnSpPr>
-        <p:spPr bwMode="auto">
-          <a:xfrm flipV="1">
-            <a:off x="764352" y="4619193"/>
-            <a:ext cx="9057456" cy="9902"/>
-          </a:xfrm>
-          <a:prstGeom prst="straightConnector1">
-            <a:avLst/>
-          </a:prstGeom>
-          <a:solidFill>
-            <a:schemeClr val="accent1"/>
-          </a:solidFill>
-          <a:ln w="9525" cap="flat" cmpd="sng" algn="ctr">
-            <a:solidFill>
-              <a:schemeClr val="accent6">
-                <a:lumMod val="60000"/>
-                <a:lumOff val="40000"/>
-              </a:schemeClr>
-            </a:solidFill>
-            <a:prstDash val="solid"/>
-            <a:round/>
-            <a:headEnd type="none" w="med" len="med"/>
-            <a:tailEnd type="none" w="med" len="med"/>
-          </a:ln>
-          <a:effectLst/>
-        </p:spPr>
-      </p:cxnSp>
-      <p:cxnSp>
-        <p:nvCxnSpPr>
-          <p:cNvPr id="27" name="Straight Arrow Connector 26"/>
-          <p:cNvCxnSpPr/>
-          <p:nvPr/>
-        </p:nvCxnSpPr>
-        <p:spPr bwMode="auto">
-          <a:xfrm flipV="1">
-            <a:off x="792088" y="1219358"/>
-            <a:ext cx="9057456" cy="6117"/>
-          </a:xfrm>
-          <a:prstGeom prst="straightConnector1">
-            <a:avLst/>
-          </a:prstGeom>
-          <a:solidFill>
-            <a:schemeClr val="accent1"/>
-          </a:solidFill>
-          <a:ln w="9525" cap="flat" cmpd="sng" algn="ctr">
-            <a:solidFill>
-              <a:schemeClr val="accent6">
-                <a:lumMod val="60000"/>
-                <a:lumOff val="40000"/>
-              </a:schemeClr>
-            </a:solidFill>
-            <a:prstDash val="solid"/>
-            <a:round/>
-            <a:headEnd type="none" w="med" len="med"/>
-            <a:tailEnd type="none" w="med" len="med"/>
-          </a:ln>
-          <a:effectLst/>
-        </p:spPr>
-      </p:cxnSp>
       <p:sp>
         <p:nvSpPr>
           <p:cNvPr id="2" name="Freeform 1"/>
@@ -13240,7 +12133,7 @@
         </p:nvSpPr>
         <p:spPr>
           <a:xfrm>
-            <a:off x="806946" y="2492896"/>
+            <a:off x="532865" y="712641"/>
             <a:ext cx="8826574" cy="3888432"/>
           </a:xfrm>
           <a:custGeom>
@@ -13344,7 +12237,7 @@
         </p:nvSpPr>
         <p:spPr>
           <a:xfrm>
-            <a:off x="3165406" y="4305300"/>
+            <a:off x="2891325" y="2525045"/>
             <a:ext cx="466794" cy="261610"/>
           </a:xfrm>
           <a:prstGeom prst="rect">
@@ -13377,7 +12270,7 @@
         </p:nvSpPr>
         <p:spPr>
           <a:xfrm>
-            <a:off x="3784600" y="4326870"/>
+            <a:off x="3510519" y="2546615"/>
             <a:ext cx="466794" cy="261610"/>
           </a:xfrm>
           <a:prstGeom prst="rect">
@@ -13410,7 +12303,7 @@
         </p:nvSpPr>
         <p:spPr>
           <a:xfrm>
-            <a:off x="4017997" y="3814086"/>
+            <a:off x="3743916" y="2033831"/>
             <a:ext cx="2559806" cy="774394"/>
           </a:xfrm>
           <a:prstGeom prst="rect">
@@ -13443,7 +12336,7 @@
         </p:nvSpPr>
         <p:spPr>
           <a:xfrm>
-            <a:off x="828912" y="1651447"/>
+            <a:off x="467052" y="94531"/>
             <a:ext cx="2356207" cy="769441"/>
           </a:xfrm>
           <a:prstGeom prst="rect">
@@ -13476,7 +12369,7 @@
         </p:nvGrpSpPr>
         <p:grpSpPr>
           <a:xfrm>
-            <a:off x="776536" y="6432224"/>
+            <a:off x="502455" y="4651969"/>
             <a:ext cx="9045272" cy="493824"/>
             <a:chOff x="848544" y="4709962"/>
             <a:chExt cx="9045272" cy="493824"/>
@@ -13622,7 +12515,7 @@
         </p:nvCxnSpPr>
         <p:spPr bwMode="auto">
           <a:xfrm flipV="1">
-            <a:off x="841883" y="2067540"/>
+            <a:off x="567802" y="287286"/>
             <a:ext cx="1752712" cy="4313791"/>
           </a:xfrm>
           <a:prstGeom prst="line">
@@ -13664,7 +12557,7 @@
         </p:blipFill>
         <p:spPr bwMode="auto">
           <a:xfrm>
-            <a:off x="3176879" y="2420888"/>
+            <a:off x="2902798" y="640634"/>
             <a:ext cx="6603004" cy="4027807"/>
           </a:xfrm>
           <a:prstGeom prst="rect">
@@ -13713,7 +12606,7 @@
         </p:nvSpPr>
         <p:spPr bwMode="auto">
           <a:xfrm flipH="1">
-            <a:off x="3152800" y="3284984"/>
+            <a:off x="2878720" y="1504730"/>
             <a:ext cx="1515761" cy="3111241"/>
           </a:xfrm>
           <a:prstGeom prst="triangle">
@@ -13743,38 +12636,12 @@
           </a:bodyPr>
           <a:lstStyle/>
           <a:p>
-            <a:pPr marL="0" marR="0" indent="0" algn="l" defTabSz="914400" rtl="0" eaLnBrk="0" fontAlgn="base" latinLnBrk="0" hangingPunct="0">
-              <a:lnSpc>
-                <a:spcPct val="100000"/>
-              </a:lnSpc>
-              <a:spcBef>
-                <a:spcPct val="0"/>
-              </a:spcBef>
-              <a:spcAft>
-                <a:spcPct val="0"/>
-              </a:spcAft>
-              <a:buClrTx/>
-              <a:buSzTx/>
-              <a:buFontTx/>
-              <a:buNone/>
-              <a:tabLst/>
-            </a:pPr>
-            <a:endParaRPr kumimoji="0" lang="en-US" sz="2400" b="0" i="0" u="none" strike="noStrike" cap="none" normalizeH="0" baseline="0">
-              <a:ln>
-                <a:noFill/>
-              </a:ln>
-              <a:solidFill>
-                <a:schemeClr val="tx1"/>
-              </a:solidFill>
-              <a:effectLst/>
-              <a:latin typeface="Arial" charset="0"/>
-              <a:ea typeface="ＭＳ Ｐゴシック" pitchFamily="34" charset="-128"/>
-            </a:endParaRPr>
+            <a:endParaRPr lang="en-US"/>
           </a:p>
         </p:txBody>
       </p:sp>
-      <mc:AlternateContent xmlns:mc="http://schemas.openxmlformats.org/markup-compatibility/2006" xmlns:a14="http://schemas.microsoft.com/office/drawing/2010/main">
-        <mc:Choice Requires="a14">
+      <mc:AlternateContent xmlns:mc="http://schemas.openxmlformats.org/markup-compatibility/2006">
+        <mc:Choice xmlns:a14="http://schemas.microsoft.com/office/drawing/2010/main" Requires="a14">
           <p:sp>
             <p:nvSpPr>
               <p:cNvPr id="38" name="TextBox 37"/>
@@ -13783,7 +12650,7 @@
             </p:nvSpPr>
             <p:spPr>
               <a:xfrm>
-                <a:off x="3184676" y="5913297"/>
+                <a:off x="2910595" y="4133043"/>
                 <a:ext cx="1150022" cy="430887"/>
               </a:xfrm>
               <a:prstGeom prst="rect">
@@ -13800,7 +12667,7 @@
                 <a14:m>
                   <m:oMath xmlns:m="http://schemas.openxmlformats.org/officeDocument/2006/math">
                     <m:r>
-                      <a:rPr lang="en-AU" sz="2200" b="1" i="1" smtClean="0">
+                      <a:rPr lang="en-AU" sz="2200" b="1" i="1">
                         <a:solidFill>
                           <a:schemeClr val="bg1"/>
                         </a:solidFill>
@@ -13824,7 +12691,7 @@
             </p:txBody>
           </p:sp>
         </mc:Choice>
-        <mc:Fallback xmlns="">
+        <mc:Fallback>
           <p:sp>
             <p:nvSpPr>
               <p:cNvPr id="38" name="TextBox 37"/>
@@ -13835,16 +12702,16 @@
             </p:nvSpPr>
             <p:spPr>
               <a:xfrm>
-                <a:off x="3184676" y="5913297"/>
+                <a:off x="2910595" y="4133043"/>
                 <a:ext cx="1150022" cy="430887"/>
               </a:xfrm>
               <a:prstGeom prst="rect">
                 <a:avLst/>
               </a:prstGeom>
-              <a:blipFill rotWithShape="1">
+              <a:blipFill rotWithShape="0">
                 <a:blip r:embed="rId4"/>
                 <a:stretch>
-                  <a:fillRect t="-7042" b="-28169"/>
+                  <a:fillRect t="-8451" b="-28169"/>
                 </a:stretch>
               </a:blipFill>
             </p:spPr>
@@ -13871,7 +12738,7 @@
         </p:nvCxnSpPr>
         <p:spPr bwMode="auto">
           <a:xfrm flipH="1" flipV="1">
-            <a:off x="2576736" y="2060849"/>
+            <a:off x="2302655" y="280594"/>
             <a:ext cx="2144292" cy="4343492"/>
           </a:xfrm>
           <a:prstGeom prst="line">
@@ -13900,7 +12767,7 @@
         </p:nvSpPr>
         <p:spPr>
           <a:xfrm>
-            <a:off x="3970176" y="5301208"/>
+            <a:off x="3696095" y="3520954"/>
             <a:ext cx="982824" cy="461665"/>
           </a:xfrm>
           <a:prstGeom prst="rect">
@@ -13933,7 +12800,7 @@
         </p:nvSpPr>
         <p:spPr>
           <a:xfrm>
-            <a:off x="-987552" y="-512064"/>
+            <a:off x="-1261633" y="-1383475"/>
             <a:ext cx="65" cy="338554"/>
           </a:xfrm>
           <a:prstGeom prst="rect">
@@ -13951,6 +12818,102 @@
           </a:p>
         </p:txBody>
       </p:sp>
+      <p:cxnSp>
+        <p:nvCxnSpPr>
+          <p:cNvPr id="31" name="Straight Arrow Connector 30"/>
+          <p:cNvCxnSpPr/>
+          <p:nvPr/>
+        </p:nvCxnSpPr>
+        <p:spPr bwMode="auto">
+          <a:xfrm>
+            <a:off x="560513" y="1541304"/>
+            <a:ext cx="9067023" cy="0"/>
+          </a:xfrm>
+          <a:prstGeom prst="straightConnector1">
+            <a:avLst/>
+          </a:prstGeom>
+          <a:solidFill>
+            <a:schemeClr val="accent1"/>
+          </a:solidFill>
+          <a:ln w="9525" cap="flat" cmpd="sng" algn="ctr">
+            <a:solidFill>
+              <a:schemeClr val="accent6">
+                <a:lumMod val="60000"/>
+                <a:lumOff val="40000"/>
+              </a:schemeClr>
+            </a:solidFill>
+            <a:prstDash val="solid"/>
+            <a:round/>
+            <a:headEnd type="none" w="med" len="med"/>
+            <a:tailEnd type="none" w="med" len="med"/>
+          </a:ln>
+          <a:effectLst/>
+        </p:spPr>
+      </p:cxnSp>
+      <p:cxnSp>
+        <p:nvCxnSpPr>
+          <p:cNvPr id="32" name="Straight Arrow Connector 31"/>
+          <p:cNvCxnSpPr/>
+          <p:nvPr/>
+        </p:nvCxnSpPr>
+        <p:spPr bwMode="auto">
+          <a:xfrm>
+            <a:off x="560513" y="2981464"/>
+            <a:ext cx="9067023" cy="0"/>
+          </a:xfrm>
+          <a:prstGeom prst="straightConnector1">
+            <a:avLst/>
+          </a:prstGeom>
+          <a:solidFill>
+            <a:schemeClr val="accent1"/>
+          </a:solidFill>
+          <a:ln w="9525" cap="flat" cmpd="sng" algn="ctr">
+            <a:solidFill>
+              <a:schemeClr val="accent6">
+                <a:lumMod val="60000"/>
+                <a:lumOff val="40000"/>
+              </a:schemeClr>
+            </a:solidFill>
+            <a:prstDash val="solid"/>
+            <a:round/>
+            <a:headEnd type="none" w="med" len="med"/>
+            <a:tailEnd type="none" w="med" len="med"/>
+          </a:ln>
+          <a:effectLst/>
+        </p:spPr>
+      </p:cxnSp>
+      <p:cxnSp>
+        <p:nvCxnSpPr>
+          <p:cNvPr id="34" name="Straight Arrow Connector 33"/>
+          <p:cNvCxnSpPr/>
+          <p:nvPr/>
+        </p:nvCxnSpPr>
+        <p:spPr bwMode="auto">
+          <a:xfrm>
+            <a:off x="532644" y="101144"/>
+            <a:ext cx="9067023" cy="0"/>
+          </a:xfrm>
+          <a:prstGeom prst="straightConnector1">
+            <a:avLst/>
+          </a:prstGeom>
+          <a:solidFill>
+            <a:schemeClr val="accent1"/>
+          </a:solidFill>
+          <a:ln w="9525" cap="flat" cmpd="sng" algn="ctr">
+            <a:solidFill>
+              <a:schemeClr val="accent6">
+                <a:lumMod val="60000"/>
+                <a:lumOff val="40000"/>
+              </a:schemeClr>
+            </a:solidFill>
+            <a:prstDash val="solid"/>
+            <a:round/>
+            <a:headEnd type="none" w="med" len="med"/>
+            <a:tailEnd type="none" w="med" len="med"/>
+          </a:ln>
+          <a:effectLst/>
+        </p:spPr>
+      </p:cxnSp>
     </p:spTree>
     <p:extLst>
       <p:ext uri="{BB962C8B-B14F-4D97-AF65-F5344CB8AC3E}">
@@ -13994,7 +12957,7 @@
           </p:nvPr>
         </p:nvGraphicFramePr>
         <p:xfrm>
-          <a:off x="-65904" y="588168"/>
+          <a:off x="-65904" y="-320676"/>
           <a:ext cx="4808984" cy="2780928"/>
         </p:xfrm>
         <a:graphic>
@@ -14016,7 +12979,7 @@
           </p:nvPr>
         </p:nvGraphicFramePr>
         <p:xfrm>
-          <a:off x="4808984" y="576063"/>
+          <a:off x="4808984" y="-332781"/>
           <a:ext cx="4808984" cy="2782800"/>
         </p:xfrm>
         <a:graphic>
@@ -14038,7 +13001,7 @@
           </p:nvPr>
         </p:nvGraphicFramePr>
         <p:xfrm>
-          <a:off x="-65904" y="4170066"/>
+          <a:off x="-65904" y="3261222"/>
           <a:ext cx="4874768" cy="2780928"/>
         </p:xfrm>
         <a:graphic>
@@ -14060,7 +13023,7 @@
           </p:nvPr>
         </p:nvGraphicFramePr>
         <p:xfrm>
-          <a:off x="4812486" y="4167689"/>
+          <a:off x="4812486" y="3258846"/>
           <a:ext cx="4805482" cy="2783305"/>
         </p:xfrm>
         <a:graphic>
@@ -14077,7 +13040,7 @@
         </p:nvSpPr>
         <p:spPr>
           <a:xfrm>
-            <a:off x="0" y="-27386"/>
+            <a:off x="0" y="-936230"/>
             <a:ext cx="4464496" cy="677108"/>
           </a:xfrm>
           <a:prstGeom prst="rect">
@@ -14110,7 +13073,7 @@
         </p:nvSpPr>
         <p:spPr>
           <a:xfrm>
-            <a:off x="14682" y="3519618"/>
+            <a:off x="14682" y="2610774"/>
             <a:ext cx="5112568" cy="677108"/>
           </a:xfrm>
           <a:prstGeom prst="rect">
@@ -14158,7 +13121,7 @@
         </p:nvSpPr>
         <p:spPr>
           <a:xfrm>
-            <a:off x="5222729" y="-27385"/>
+            <a:off x="5222730" y="-936229"/>
             <a:ext cx="4554807" cy="677108"/>
           </a:xfrm>
           <a:prstGeom prst="rect">
@@ -14191,7 +13154,7 @@
         </p:nvSpPr>
         <p:spPr>
           <a:xfrm>
-            <a:off x="5150721" y="3519617"/>
+            <a:off x="5150721" y="2610773"/>
             <a:ext cx="4320480" cy="677108"/>
           </a:xfrm>
           <a:prstGeom prst="rect">
@@ -14259,7 +13222,7 @@
           </p:nvPr>
         </p:nvGraphicFramePr>
         <p:xfrm>
-          <a:off x="0" y="0"/>
+          <a:off x="0" y="-908844"/>
           <a:ext cx="9906000" cy="6858000"/>
         </p:xfrm>
         <a:graphic>
@@ -14276,7 +13239,7 @@
         </p:nvSpPr>
         <p:spPr>
           <a:xfrm>
-            <a:off x="2792760" y="980728"/>
+            <a:off x="2792760" y="71884"/>
             <a:ext cx="2232248" cy="677108"/>
           </a:xfrm>
           <a:prstGeom prst="rect">
@@ -14309,7 +13272,7 @@
         </p:nvSpPr>
         <p:spPr>
           <a:xfrm>
-            <a:off x="5313040" y="2636912"/>
+            <a:off x="5313040" y="1728068"/>
             <a:ext cx="2232248" cy="338554"/>
           </a:xfrm>
           <a:prstGeom prst="rect">
@@ -14377,7 +13340,7 @@
           </p:nvPr>
         </p:nvGraphicFramePr>
         <p:xfrm>
-          <a:off x="-15552" y="3335506"/>
+          <a:off x="-15552" y="2426662"/>
           <a:ext cx="9921552" cy="4055586"/>
         </p:xfrm>
         <a:graphic>
@@ -14399,7 +13362,7 @@
           </p:nvPr>
         </p:nvGraphicFramePr>
         <p:xfrm>
-          <a:off x="-15552" y="288032"/>
+          <a:off x="-15552" y="-620812"/>
           <a:ext cx="9921552" cy="2708920"/>
         </p:xfrm>
         <a:graphic>
@@ -14416,7 +13379,7 @@
         </p:nvCxnSpPr>
         <p:spPr bwMode="auto">
           <a:xfrm flipV="1">
-            <a:off x="7008812" y="877638"/>
+            <a:off x="7008813" y="-31206"/>
             <a:ext cx="2348337" cy="1"/>
           </a:xfrm>
           <a:prstGeom prst="line">
@@ -14445,7 +13408,7 @@
         </p:nvCxnSpPr>
         <p:spPr bwMode="auto">
           <a:xfrm>
-            <a:off x="1891072" y="5878924"/>
+            <a:off x="1891073" y="4970080"/>
             <a:ext cx="1907117" cy="0"/>
           </a:xfrm>
           <a:prstGeom prst="line">
@@ -14474,7 +13437,7 @@
         </p:nvCxnSpPr>
         <p:spPr bwMode="auto">
           <a:xfrm flipV="1">
-            <a:off x="4569132" y="1582682"/>
+            <a:off x="4569133" y="673839"/>
             <a:ext cx="1340225" cy="741"/>
           </a:xfrm>
           <a:prstGeom prst="line">
@@ -14503,7 +13466,7 @@
         </p:nvCxnSpPr>
         <p:spPr bwMode="auto">
           <a:xfrm flipV="1">
-            <a:off x="4433392" y="4740080"/>
+            <a:off x="4433392" y="3831236"/>
             <a:ext cx="1611704" cy="1092"/>
           </a:xfrm>
           <a:prstGeom prst="line">
@@ -14532,7 +13495,7 @@
         </p:nvCxnSpPr>
         <p:spPr bwMode="auto">
           <a:xfrm flipV="1">
-            <a:off x="7041232" y="3862340"/>
+            <a:off x="7041232" y="2953496"/>
             <a:ext cx="1259396" cy="1092"/>
           </a:xfrm>
           <a:prstGeom prst="line">
@@ -14561,7 +13524,7 @@
         </p:nvSpPr>
         <p:spPr>
           <a:xfrm>
-            <a:off x="-15552" y="-50522"/>
+            <a:off x="-15552" y="-959366"/>
             <a:ext cx="4304928" cy="276999"/>
           </a:xfrm>
           <a:prstGeom prst="rect">
@@ -14590,7 +13553,7 @@
         </p:nvSpPr>
         <p:spPr>
           <a:xfrm>
-            <a:off x="-15552" y="2996952"/>
+            <a:off x="-15552" y="2088109"/>
             <a:ext cx="4385196" cy="276999"/>
           </a:xfrm>
           <a:prstGeom prst="rect">
@@ -14619,7 +13582,7 @@
         </p:nvCxnSpPr>
         <p:spPr bwMode="auto">
           <a:xfrm>
-            <a:off x="2432720" y="2132856"/>
+            <a:off x="2432720" y="1224012"/>
             <a:ext cx="1224136" cy="0"/>
           </a:xfrm>
           <a:prstGeom prst="line">
@@ -14672,13 +13635,13 @@
       </p:grpSpPr>
       <p:cxnSp>
         <p:nvCxnSpPr>
-          <p:cNvPr id="5" name="Straight Connector 4"/>
+          <p:cNvPr id="2" name="Straight Connector 1"/>
           <p:cNvCxnSpPr/>
           <p:nvPr/>
         </p:nvCxnSpPr>
         <p:spPr bwMode="auto">
           <a:xfrm>
-            <a:off x="202507" y="6485208"/>
+            <a:off x="364810" y="4735135"/>
             <a:ext cx="9415461" cy="0"/>
           </a:xfrm>
           <a:prstGeom prst="line">
@@ -14689,7 +13652,7 @@
           </a:solidFill>
           <a:ln w="9525" cap="flat" cmpd="sng" algn="ctr">
             <a:solidFill>
-              <a:schemeClr val="accent6"/>
+              <a:schemeClr val="tx1"/>
             </a:solidFill>
             <a:prstDash val="solid"/>
             <a:round/>
@@ -14701,13 +13664,13 @@
       </p:cxnSp>
       <p:cxnSp>
         <p:nvCxnSpPr>
-          <p:cNvPr id="10" name="Straight Arrow Connector 9"/>
+          <p:cNvPr id="3" name="Straight Arrow Connector 2"/>
           <p:cNvCxnSpPr/>
           <p:nvPr/>
         </p:nvCxnSpPr>
         <p:spPr bwMode="auto">
           <a:xfrm>
-            <a:off x="226875" y="3263265"/>
+            <a:off x="252018" y="1613473"/>
             <a:ext cx="9391093" cy="0"/>
           </a:xfrm>
           <a:prstGeom prst="straightConnector1">
@@ -14733,13 +13696,13 @@
       </p:cxnSp>
       <p:cxnSp>
         <p:nvCxnSpPr>
-          <p:cNvPr id="11" name="Straight Arrow Connector 10"/>
+          <p:cNvPr id="4" name="Straight Arrow Connector 3"/>
           <p:cNvCxnSpPr/>
           <p:nvPr/>
         </p:nvCxnSpPr>
         <p:spPr bwMode="auto">
           <a:xfrm>
-            <a:off x="214691" y="5005596"/>
+            <a:off x="239834" y="3174304"/>
             <a:ext cx="9403277" cy="0"/>
           </a:xfrm>
           <a:prstGeom prst="straightConnector1">
@@ -14765,13 +13728,13 @@
       </p:cxnSp>
       <p:cxnSp>
         <p:nvCxnSpPr>
-          <p:cNvPr id="12" name="Straight Arrow Connector 11"/>
+          <p:cNvPr id="5" name="Straight Arrow Connector 4"/>
           <p:cNvCxnSpPr/>
           <p:nvPr/>
         </p:nvCxnSpPr>
         <p:spPr bwMode="auto">
           <a:xfrm flipV="1">
-            <a:off x="200472" y="1601976"/>
+            <a:off x="225614" y="52640"/>
             <a:ext cx="9417496" cy="2"/>
           </a:xfrm>
           <a:prstGeom prst="straightConnector1">
@@ -14797,28 +13760,28 @@
       </p:cxnSp>
       <p:grpSp>
         <p:nvGrpSpPr>
-          <p:cNvPr id="2055" name="Group 2054"/>
+          <p:cNvPr id="6" name="Group 5"/>
           <p:cNvGrpSpPr/>
           <p:nvPr/>
         </p:nvGrpSpPr>
         <p:grpSpPr>
           <a:xfrm>
-            <a:off x="128464" y="635539"/>
-            <a:ext cx="9554261" cy="6177837"/>
-            <a:chOff x="729454" y="-1411538"/>
-            <a:chExt cx="8951575" cy="8201330"/>
+            <a:off x="-262939" y="242454"/>
+            <a:ext cx="10107966" cy="4892871"/>
+            <a:chOff x="210677" y="435440"/>
+            <a:chExt cx="9470352" cy="6495485"/>
           </a:xfrm>
         </p:grpSpPr>
         <p:pic>
           <p:nvPicPr>
-            <p:cNvPr id="13" name="Picture 5"/>
+            <p:cNvPr id="7" name="Picture 5"/>
             <p:cNvPicPr>
               <a:picLocks noChangeAspect="1" noChangeArrowheads="1"/>
             </p:cNvPicPr>
             <p:nvPr/>
           </p:nvPicPr>
           <p:blipFill>
-            <a:blip r:embed="rId3">
+            <a:blip r:embed="rId2">
               <a:extLst>
                 <a:ext uri="{28A0092B-C50C-407E-A947-70E740481C1C}">
                   <a14:useLocalDpi xmlns:a14="http://schemas.microsoft.com/office/drawing/2010/main" val="0"/>
@@ -14833,7 +13796,7 @@
           <p:spPr bwMode="auto">
             <a:xfrm>
               <a:off x="729454" y="793438"/>
-              <a:ext cx="8913813" cy="5627687"/>
+              <a:ext cx="8913814" cy="5627687"/>
             </a:xfrm>
             <a:prstGeom prst="rect">
               <a:avLst/>
@@ -14875,14 +13838,14 @@
         </p:pic>
         <p:pic>
           <p:nvPicPr>
-            <p:cNvPr id="14" name="Picture 3"/>
+            <p:cNvPr id="8" name="Picture 3"/>
             <p:cNvPicPr>
               <a:picLocks noChangeAspect="1" noChangeArrowheads="1"/>
             </p:cNvPicPr>
             <p:nvPr/>
           </p:nvPicPr>
           <p:blipFill rotWithShape="1">
-            <a:blip r:embed="rId4">
+            <a:blip r:embed="rId3">
               <a:extLst>
                 <a:ext uri="{28A0092B-C50C-407E-A947-70E740481C1C}">
                   <a14:useLocalDpi xmlns:a14="http://schemas.microsoft.com/office/drawing/2010/main" val="0"/>
@@ -14937,14 +13900,14 @@
         </p:pic>
         <p:pic>
           <p:nvPicPr>
-            <p:cNvPr id="15" name="Picture 4"/>
+            <p:cNvPr id="9" name="Picture 4"/>
             <p:cNvPicPr>
               <a:picLocks noChangeAspect="1" noChangeArrowheads="1"/>
             </p:cNvPicPr>
             <p:nvPr/>
           </p:nvPicPr>
           <p:blipFill rotWithShape="1">
-            <a:blip r:embed="rId5">
+            <a:blip r:embed="rId4">
               <a:extLst>
                 <a:ext uri="{28A0092B-C50C-407E-A947-70E740481C1C}">
                   <a14:useLocalDpi xmlns:a14="http://schemas.microsoft.com/office/drawing/2010/main" val="0"/>
@@ -14999,172 +13962,124 @@
         </p:pic>
         <p:grpSp>
           <p:nvGrpSpPr>
-            <p:cNvPr id="16" name="Group 15"/>
+            <p:cNvPr id="10" name="Group 9"/>
             <p:cNvGrpSpPr/>
             <p:nvPr/>
           </p:nvGrpSpPr>
           <p:grpSpPr>
             <a:xfrm>
-              <a:off x="1272276" y="4332040"/>
-              <a:ext cx="3141107" cy="2457752"/>
-              <a:chOff x="1287828" y="4326870"/>
-              <a:chExt cx="3141107" cy="2457752"/>
+              <a:off x="1272276" y="6352144"/>
+              <a:ext cx="3141107" cy="578781"/>
+              <a:chOff x="1359836" y="4675608"/>
+              <a:chExt cx="3141107" cy="578781"/>
             </a:xfrm>
           </p:grpSpPr>
           <p:sp>
             <p:nvSpPr>
-              <p:cNvPr id="17" name="TextBox 16"/>
+              <p:cNvPr id="25" name="TextBox 24"/>
               <p:cNvSpPr txBox="1"/>
               <p:nvPr/>
             </p:nvSpPr>
             <p:spPr>
               <a:xfrm>
-                <a:off x="3784600" y="4326870"/>
-                <a:ext cx="466794" cy="261610"/>
+                <a:off x="2598247" y="4682368"/>
+                <a:ext cx="420130" cy="572020"/>
               </a:xfrm>
               <a:prstGeom prst="rect">
                 <a:avLst/>
               </a:prstGeom>
               <a:noFill/>
+              <a:ln>
+                <a:noFill/>
+                <a:headEnd type="none" w="med" len="med"/>
+                <a:tailEnd type="none" w="med" len="med"/>
+              </a:ln>
             </p:spPr>
             <p:txBody>
-              <a:bodyPr wrap="none" rtlCol="0">
+              <a:bodyPr wrap="square" rtlCol="0">
                 <a:spAutoFit/>
               </a:bodyPr>
               <a:lstStyle/>
               <a:p>
                 <a:r>
-                  <a:rPr lang="en-AU" sz="1100" b="1" dirty="0">
-                    <a:solidFill>
-                      <a:schemeClr val="bg1"/>
-                    </a:solidFill>
-                  </a:rPr>
-                  <a:t>50%</a:t>
+                  <a:rPr lang="en-AU" sz="2200" dirty="0"/>
+                  <a:t>1</a:t>
                 </a:r>
               </a:p>
             </p:txBody>
           </p:sp>
-          <p:grpSp>
-            <p:nvGrpSpPr>
-              <p:cNvPr id="18" name="Group 17"/>
-              <p:cNvGrpSpPr/>
+          <p:sp>
+            <p:nvSpPr>
+              <p:cNvPr id="26" name="TextBox 25"/>
+              <p:cNvSpPr txBox="1"/>
               <p:nvPr/>
-            </p:nvGrpSpPr>
-            <p:grpSpPr>
+            </p:nvSpPr>
+            <p:spPr>
               <a:xfrm>
-                <a:off x="1287828" y="6346974"/>
-                <a:ext cx="3141107" cy="437648"/>
-                <a:chOff x="1359836" y="4675608"/>
-                <a:chExt cx="3141107" cy="437648"/>
+                <a:off x="1359836" y="4675608"/>
+                <a:ext cx="1548615" cy="572020"/>
               </a:xfrm>
-            </p:grpSpPr>
-            <p:sp>
-              <p:nvSpPr>
-                <p:cNvPr id="21" name="TextBox 20"/>
-                <p:cNvSpPr txBox="1"/>
-                <p:nvPr/>
-              </p:nvSpPr>
-              <p:spPr>
-                <a:xfrm>
-                  <a:off x="2598247" y="4682368"/>
-                  <a:ext cx="420130" cy="430888"/>
-                </a:xfrm>
-                <a:prstGeom prst="rect">
-                  <a:avLst/>
-                </a:prstGeom>
+              <a:prstGeom prst="rect">
+                <a:avLst/>
+              </a:prstGeom>
+              <a:noFill/>
+              <a:ln>
                 <a:noFill/>
-                <a:ln>
-                  <a:noFill/>
-                  <a:headEnd type="none" w="med" len="med"/>
-                  <a:tailEnd type="none" w="med" len="med"/>
-                </a:ln>
-              </p:spPr>
-              <p:txBody>
-                <a:bodyPr wrap="square" rtlCol="0">
-                  <a:spAutoFit/>
-                </a:bodyPr>
-                <a:lstStyle/>
-                <a:p>
-                  <a:r>
-                    <a:rPr lang="en-AU" sz="2200" dirty="0"/>
-                    <a:t>1</a:t>
-                  </a:r>
-                </a:p>
-              </p:txBody>
-            </p:sp>
-            <p:sp>
-              <p:nvSpPr>
-                <p:cNvPr id="25" name="TextBox 24"/>
-                <p:cNvSpPr txBox="1"/>
-                <p:nvPr/>
-              </p:nvSpPr>
-              <p:spPr>
-                <a:xfrm>
-                  <a:off x="1359836" y="4675608"/>
-                  <a:ext cx="1548615" cy="430888"/>
-                </a:xfrm>
-                <a:prstGeom prst="rect">
-                  <a:avLst/>
-                </a:prstGeom>
+                <a:headEnd type="none" w="med" len="med"/>
+                <a:tailEnd type="none" w="med" len="med"/>
+              </a:ln>
+            </p:spPr>
+            <p:txBody>
+              <a:bodyPr wrap="square" rtlCol="0">
+                <a:spAutoFit/>
+              </a:bodyPr>
+              <a:lstStyle/>
+              <a:p>
+                <a:r>
+                  <a:rPr lang="en-AU" sz="2200" dirty="0"/>
+                  <a:t>Underrun</a:t>
+                </a:r>
+              </a:p>
+            </p:txBody>
+          </p:sp>
+          <p:sp>
+            <p:nvSpPr>
+              <p:cNvPr id="27" name="TextBox 26"/>
+              <p:cNvSpPr txBox="1"/>
+              <p:nvPr/>
+            </p:nvSpPr>
+            <p:spPr>
+              <a:xfrm>
+                <a:off x="2952328" y="4682369"/>
+                <a:ext cx="1548615" cy="572020"/>
+              </a:xfrm>
+              <a:prstGeom prst="rect">
+                <a:avLst/>
+              </a:prstGeom>
+              <a:noFill/>
+              <a:ln>
                 <a:noFill/>
-                <a:ln>
-                  <a:noFill/>
-                  <a:headEnd type="none" w="med" len="med"/>
-                  <a:tailEnd type="none" w="med" len="med"/>
-                </a:ln>
-              </p:spPr>
-              <p:txBody>
-                <a:bodyPr wrap="square" rtlCol="0">
-                  <a:spAutoFit/>
-                </a:bodyPr>
-                <a:lstStyle/>
-                <a:p>
-                  <a:r>
-                    <a:rPr lang="en-AU" sz="2200" dirty="0"/>
-                    <a:t>Underrun</a:t>
-                  </a:r>
-                </a:p>
-              </p:txBody>
-            </p:sp>
-            <p:sp>
-              <p:nvSpPr>
-                <p:cNvPr id="26" name="TextBox 25"/>
-                <p:cNvSpPr txBox="1"/>
-                <p:nvPr/>
-              </p:nvSpPr>
-              <p:spPr>
-                <a:xfrm>
-                  <a:off x="2952328" y="4682369"/>
-                  <a:ext cx="1548615" cy="430887"/>
-                </a:xfrm>
-                <a:prstGeom prst="rect">
-                  <a:avLst/>
-                </a:prstGeom>
-                <a:noFill/>
-                <a:ln>
-                  <a:noFill/>
-                  <a:headEnd type="none" w="med" len="med"/>
-                  <a:tailEnd type="none" w="med" len="med"/>
-                </a:ln>
-              </p:spPr>
-              <p:txBody>
-                <a:bodyPr wrap="square" rtlCol="0">
-                  <a:spAutoFit/>
-                </a:bodyPr>
-                <a:lstStyle/>
-                <a:p>
-                  <a:r>
-                    <a:rPr lang="en-AU" sz="2200" dirty="0"/>
-                    <a:t>Overrun</a:t>
-                  </a:r>
-                </a:p>
-              </p:txBody>
-            </p:sp>
-          </p:grpSp>
+                <a:headEnd type="none" w="med" len="med"/>
+                <a:tailEnd type="none" w="med" len="med"/>
+              </a:ln>
+            </p:spPr>
+            <p:txBody>
+              <a:bodyPr wrap="square" rtlCol="0">
+                <a:spAutoFit/>
+              </a:bodyPr>
+              <a:lstStyle/>
+              <a:p>
+                <a:r>
+                  <a:rPr lang="en-AU" sz="2200" dirty="0"/>
+                  <a:t>Overrun</a:t>
+                </a:r>
+              </a:p>
+            </p:txBody>
+          </p:sp>
         </p:grpSp>
         <p:cxnSp>
           <p:nvCxnSpPr>
-            <p:cNvPr id="27" name="Straight Arrow Connector 26"/>
+            <p:cNvPr id="11" name="Straight Arrow Connector 10"/>
             <p:cNvCxnSpPr/>
             <p:nvPr/>
           </p:nvCxnSpPr>
@@ -15193,7 +14108,7 @@
         </p:cxnSp>
         <p:cxnSp>
           <p:nvCxnSpPr>
-            <p:cNvPr id="29" name="Straight Connector 28"/>
+            <p:cNvPr id="12" name="Straight Connector 11"/>
             <p:cNvCxnSpPr/>
             <p:nvPr/>
           </p:nvCxnSpPr>
@@ -15222,7 +14137,7 @@
         </p:cxnSp>
         <p:cxnSp>
           <p:nvCxnSpPr>
-            <p:cNvPr id="30" name="Straight Connector 29"/>
+            <p:cNvPr id="13" name="Straight Connector 12"/>
             <p:cNvCxnSpPr/>
             <p:nvPr/>
           </p:nvCxnSpPr>
@@ -15251,7 +14166,7 @@
         </p:cxnSp>
         <p:cxnSp>
           <p:nvCxnSpPr>
-            <p:cNvPr id="31" name="Straight Connector 30"/>
+            <p:cNvPr id="14" name="Straight Connector 13"/>
             <p:cNvCxnSpPr/>
             <p:nvPr/>
           </p:nvCxnSpPr>
@@ -15280,14 +14195,14 @@
         </p:cxnSp>
         <p:sp>
           <p:nvSpPr>
-            <p:cNvPr id="32" name="TextBox 31"/>
+            <p:cNvPr id="15" name="TextBox 14"/>
             <p:cNvSpPr txBox="1"/>
             <p:nvPr/>
           </p:nvSpPr>
           <p:spPr>
             <a:xfrm>
               <a:off x="3475536" y="2535163"/>
-              <a:ext cx="2322114" cy="430887"/>
+              <a:ext cx="2322114" cy="572020"/>
             </a:xfrm>
             <a:prstGeom prst="rect">
               <a:avLst/>
@@ -15314,14 +14229,14 @@
         </p:sp>
         <p:sp>
           <p:nvSpPr>
-            <p:cNvPr id="33" name="TextBox 32"/>
+            <p:cNvPr id="16" name="TextBox 15"/>
             <p:cNvSpPr txBox="1"/>
             <p:nvPr/>
           </p:nvSpPr>
           <p:spPr>
             <a:xfrm>
               <a:off x="3669665" y="3539611"/>
-              <a:ext cx="2322114" cy="430887"/>
+              <a:ext cx="2322114" cy="572020"/>
             </a:xfrm>
             <a:prstGeom prst="rect">
               <a:avLst/>
@@ -15348,14 +14263,14 @@
         </p:sp>
         <p:sp>
           <p:nvSpPr>
-            <p:cNvPr id="34" name="TextBox 33"/>
+            <p:cNvPr id="17" name="TextBox 16"/>
             <p:cNvSpPr txBox="1"/>
             <p:nvPr/>
           </p:nvSpPr>
           <p:spPr>
             <a:xfrm>
               <a:off x="1768390" y="5929450"/>
-              <a:ext cx="608451" cy="338553"/>
+              <a:ext cx="608451" cy="449444"/>
             </a:xfrm>
             <a:prstGeom prst="rect">
               <a:avLst/>
@@ -15377,14 +14292,14 @@
         </p:sp>
         <p:sp>
           <p:nvSpPr>
-            <p:cNvPr id="35" name="TextBox 34"/>
+            <p:cNvPr id="18" name="TextBox 17"/>
             <p:cNvSpPr txBox="1"/>
             <p:nvPr/>
           </p:nvSpPr>
           <p:spPr>
             <a:xfrm>
               <a:off x="2940674" y="5929450"/>
-              <a:ext cx="608451" cy="338553"/>
+              <a:ext cx="608451" cy="449444"/>
             </a:xfrm>
             <a:prstGeom prst="rect">
               <a:avLst/>
@@ -15406,14 +14321,14 @@
         </p:sp>
         <p:sp>
           <p:nvSpPr>
-            <p:cNvPr id="36" name="TextBox 35"/>
+            <p:cNvPr id="19" name="TextBox 18"/>
             <p:cNvSpPr txBox="1"/>
             <p:nvPr/>
           </p:nvSpPr>
           <p:spPr>
             <a:xfrm>
-              <a:off x="3912501" y="5930646"/>
-              <a:ext cx="608451" cy="338553"/>
+              <a:off x="3912501" y="5929450"/>
+              <a:ext cx="608451" cy="449444"/>
             </a:xfrm>
             <a:prstGeom prst="rect">
               <a:avLst/>
@@ -15427,7 +14342,11 @@
             <a:lstStyle/>
             <a:p>
               <a:r>
-                <a:rPr lang="en-AU" sz="2200" b="1" dirty="0"/>
+                <a:rPr lang="en-AU" sz="2200" b="1" dirty="0">
+                  <a:solidFill>
+                    <a:schemeClr val="bg1"/>
+                  </a:solidFill>
+                </a:rPr>
                 <a:t>10%</a:t>
               </a:r>
             </a:p>
@@ -15435,7 +14354,7 @@
         </p:sp>
         <p:cxnSp>
           <p:nvCxnSpPr>
-            <p:cNvPr id="37" name="Straight Connector 36"/>
+            <p:cNvPr id="20" name="Straight Connector 19"/>
             <p:cNvCxnSpPr/>
             <p:nvPr/>
           </p:nvCxnSpPr>
@@ -15464,14 +14383,14 @@
         </p:cxnSp>
         <p:sp>
           <p:nvSpPr>
-            <p:cNvPr id="38" name="TextBox 37"/>
+            <p:cNvPr id="21" name="TextBox 20"/>
             <p:cNvSpPr txBox="1"/>
             <p:nvPr/>
           </p:nvSpPr>
           <p:spPr>
             <a:xfrm>
               <a:off x="2589546" y="477833"/>
-              <a:ext cx="2322114" cy="430887"/>
+              <a:ext cx="2322114" cy="572020"/>
             </a:xfrm>
             <a:prstGeom prst="rect">
               <a:avLst/>
@@ -15498,13 +14417,13 @@
         </p:sp>
         <p:sp>
           <p:nvSpPr>
-            <p:cNvPr id="40" name="TextBox 39"/>
+            <p:cNvPr id="22" name="TextBox 21"/>
             <p:cNvSpPr txBox="1"/>
             <p:nvPr/>
           </p:nvSpPr>
           <p:spPr>
             <a:xfrm>
-              <a:off x="821657" y="-1411538"/>
+              <a:off x="210677" y="435440"/>
               <a:ext cx="2613662" cy="1021464"/>
             </a:xfrm>
             <a:prstGeom prst="rect">
@@ -15518,6 +14437,7 @@
             </a:bodyPr>
             <a:lstStyle/>
             <a:p>
+              <a:pPr algn="ctr"/>
               <a:r>
                 <a:rPr lang="en-AU" sz="2200" b="1" dirty="0">
                   <a:solidFill>
@@ -15546,14 +14466,14 @@
         </p:sp>
         <p:cxnSp>
           <p:nvCxnSpPr>
-            <p:cNvPr id="41" name="Straight Arrow Connector 40"/>
+            <p:cNvPr id="23" name="Straight Arrow Connector 22"/>
             <p:cNvCxnSpPr/>
             <p:nvPr/>
           </p:nvCxnSpPr>
           <p:spPr bwMode="auto">
             <a:xfrm>
-              <a:off x="1577495" y="-378208"/>
-              <a:ext cx="550993" cy="2162901"/>
+              <a:off x="1577495" y="1449984"/>
+              <a:ext cx="482252" cy="1424885"/>
             </a:xfrm>
             <a:prstGeom prst="straightConnector1">
               <a:avLst/>
@@ -15575,14 +14495,14 @@
         </p:cxnSp>
         <p:sp>
           <p:nvSpPr>
-            <p:cNvPr id="39" name="TextBox 38"/>
+            <p:cNvPr id="24" name="TextBox 23"/>
             <p:cNvSpPr txBox="1"/>
             <p:nvPr/>
           </p:nvSpPr>
           <p:spPr>
             <a:xfrm>
-              <a:off x="2043737" y="5121286"/>
-              <a:ext cx="1613119" cy="430887"/>
+              <a:off x="2043737" y="5121285"/>
+              <a:ext cx="1613119" cy="572020"/>
             </a:xfrm>
             <a:prstGeom prst="rect">
               <a:avLst/>
@@ -15610,7 +14530,7 @@
     </p:spTree>
     <p:extLst>
       <p:ext uri="{BB962C8B-B14F-4D97-AF65-F5344CB8AC3E}">
-        <p14:creationId xmlns:p14="http://schemas.microsoft.com/office/powerpoint/2010/main" val="1445884438"/>
+        <p14:creationId xmlns:p14="http://schemas.microsoft.com/office/powerpoint/2010/main" val="2263336609"/>
       </p:ext>
     </p:extLst>
   </p:cSld>

</xml_diff>